<commit_message>
Additional example, reorder others, presentation progress
Add example on faking tables; updates to some of the existing examples;
delete empty example 3, with fake table example taking its place;
several more slides in presentation
</commit_message>
<xml_diff>
--- a/tSQLt-Talk.pptx
+++ b/tSQLt-Talk.pptx
@@ -5,7 +5,7 @@
     <p:sldMasterId id="2147483696" r:id="rId1"/>
   </p:sldMasterIdLst>
   <p:notesMasterIdLst>
-    <p:notesMasterId r:id="rId11"/>
+    <p:notesMasterId r:id="rId18"/>
   </p:notesMasterIdLst>
   <p:sldIdLst>
     <p:sldId id="256" r:id="rId2"/>
@@ -17,6 +17,13 @@
     <p:sldId id="262" r:id="rId8"/>
     <p:sldId id="263" r:id="rId9"/>
     <p:sldId id="264" r:id="rId10"/>
+    <p:sldId id="266" r:id="rId11"/>
+    <p:sldId id="267" r:id="rId12"/>
+    <p:sldId id="270" r:id="rId13"/>
+    <p:sldId id="271" r:id="rId14"/>
+    <p:sldId id="265" r:id="rId15"/>
+    <p:sldId id="268" r:id="rId16"/>
+    <p:sldId id="269" r:id="rId17"/>
   </p:sldIdLst>
   <p:sldSz cx="12192000" cy="6858000"/>
   <p:notesSz cx="6858000" cy="9144000"/>
@@ -205,7 +212,7 @@
           <a:p>
             <a:fld id="{EAEDC630-68ED-486F-A3AF-CCFE83723F50}" type="datetimeFigureOut">
               <a:rPr lang="en-US" smtClean="0"/>
-              <a:t>9/25/2016</a:t>
+              <a:t>9/27/2016</a:t>
             </a:fld>
             <a:endParaRPr lang="en-US"/>
           </a:p>
@@ -1104,7 +1111,7 @@
           <a:p>
             <a:fld id="{CA430C0A-5464-4FE4-84EB-FF9C94016DF4}" type="datetimeFigureOut">
               <a:rPr lang="en-US" dirty="0"/>
-              <a:t>9/25/2016</a:t>
+              <a:t>9/27/2016</a:t>
             </a:fld>
             <a:endParaRPr lang="en-US" dirty="0"/>
           </a:p>
@@ -1270,7 +1277,7 @@
           <a:p>
             <a:fld id="{E9F9C37B-1D36-470B-8223-D6C91242EC14}" type="datetimeFigureOut">
               <a:rPr lang="en-US" dirty="0"/>
-              <a:t>9/25/2016</a:t>
+              <a:t>9/27/2016</a:t>
             </a:fld>
             <a:endParaRPr lang="en-US" dirty="0"/>
           </a:p>
@@ -1445,7 +1452,7 @@
           <a:p>
             <a:fld id="{67C6F52A-A82B-47A2-A83A-8C4C91F2D59F}" type="datetimeFigureOut">
               <a:rPr lang="en-US" dirty="0"/>
-              <a:t>9/25/2016</a:t>
+              <a:t>9/27/2016</a:t>
             </a:fld>
             <a:endParaRPr lang="en-US" dirty="0"/>
           </a:p>
@@ -1610,7 +1617,7 @@
           <a:p>
             <a:fld id="{F070A7B3-6521-4DCA-87E5-044747A908C1}" type="datetimeFigureOut">
               <a:rPr lang="en-US" dirty="0"/>
-              <a:t>9/25/2016</a:t>
+              <a:t>9/27/2016</a:t>
             </a:fld>
             <a:endParaRPr lang="en-US" dirty="0"/>
           </a:p>
@@ -1866,7 +1873,7 @@
           <a:p>
             <a:fld id="{360C6404-AD6E-4860-8E75-697CA40B95DA}" type="datetimeFigureOut">
               <a:rPr lang="en-US" dirty="0"/>
-              <a:t>9/25/2016</a:t>
+              <a:t>9/27/2016</a:t>
             </a:fld>
             <a:endParaRPr lang="en-US" dirty="0"/>
           </a:p>
@@ -2094,7 +2101,7 @@
           <a:p>
             <a:fld id="{AB134690-1557-4C89-A502-4959FE7FAD70}" type="datetimeFigureOut">
               <a:rPr lang="en-US" dirty="0"/>
-              <a:t>9/25/2016</a:t>
+              <a:t>9/27/2016</a:t>
             </a:fld>
             <a:endParaRPr lang="en-US" dirty="0"/>
           </a:p>
@@ -2444,7 +2451,7 @@
           <a:p>
             <a:fld id="{4F7D4976-E339-4826-83B7-FBD03F55ECF8}" type="datetimeFigureOut">
               <a:rPr lang="en-US" dirty="0"/>
-              <a:t>9/25/2016</a:t>
+              <a:t>9/27/2016</a:t>
             </a:fld>
             <a:endParaRPr lang="en-US" dirty="0"/>
           </a:p>
@@ -2580,7 +2587,7 @@
           <a:p>
             <a:fld id="{E1037C31-9E7A-4F99-8774-A0E530DE1A42}" type="datetimeFigureOut">
               <a:rPr lang="en-US" dirty="0"/>
-              <a:t>9/25/2016</a:t>
+              <a:t>9/27/2016</a:t>
             </a:fld>
             <a:endParaRPr lang="en-US" dirty="0"/>
           </a:p>
@@ -2670,7 +2677,7 @@
           <a:p>
             <a:fld id="{C278504F-A551-4DE0-9316-4DCD1D8CC752}" type="datetimeFigureOut">
               <a:rPr lang="en-US" dirty="0"/>
-              <a:t>9/25/2016</a:t>
+              <a:t>9/27/2016</a:t>
             </a:fld>
             <a:endParaRPr lang="en-US" dirty="0"/>
           </a:p>
@@ -3022,7 +3029,7 @@
           <a:p>
             <a:fld id="{D1BE4249-C0D0-4B06-8692-E8BB871AF643}" type="datetimeFigureOut">
               <a:rPr lang="en-US" dirty="0"/>
-              <a:t>9/25/2016</a:t>
+              <a:t>9/27/2016</a:t>
             </a:fld>
             <a:endParaRPr lang="en-US" dirty="0"/>
           </a:p>
@@ -3335,7 +3342,7 @@
           <a:p>
             <a:fld id="{042B0DB6-F5C7-45FB-8CF3-31B45F9C2DAC}" type="datetimeFigureOut">
               <a:rPr lang="en-US" dirty="0"/>
-              <a:t>9/25/2016</a:t>
+              <a:t>9/27/2016</a:t>
             </a:fld>
             <a:endParaRPr lang="en-US" dirty="0"/>
           </a:p>
@@ -3574,7 +3581,7 @@
           <a:p>
             <a:fld id="{1160EA64-D806-43AC-9DF2-F8C432F32B4C}" type="datetimeFigureOut">
               <a:rPr lang="en-US" dirty="0"/>
-              <a:t>9/25/2016</a:t>
+              <a:t>9/27/2016</a:t>
             </a:fld>
             <a:endParaRPr lang="en-US" dirty="0"/>
           </a:p>
@@ -4093,6 +4100,819 @@
 </p:sld>
 </file>
 
+<file path=ppt/slides/slide10.xml><?xml version="1.0" encoding="utf-8"?>
+<p:sld xmlns:a="http://schemas.openxmlformats.org/drawingml/2006/main" xmlns:r="http://schemas.openxmlformats.org/officeDocument/2006/relationships" xmlns:p="http://schemas.openxmlformats.org/presentationml/2006/main">
+  <p:cSld>
+    <p:spTree>
+      <p:nvGrpSpPr>
+        <p:cNvPr id="1" name=""/>
+        <p:cNvGrpSpPr/>
+        <p:nvPr/>
+      </p:nvGrpSpPr>
+      <p:grpSpPr>
+        <a:xfrm>
+          <a:off x="0" y="0"/>
+          <a:ext cx="0" cy="0"/>
+          <a:chOff x="0" y="0"/>
+          <a:chExt cx="0" cy="0"/>
+        </a:xfrm>
+      </p:grpSpPr>
+      <p:sp>
+        <p:nvSpPr>
+          <p:cNvPr id="2" name="Title 1"/>
+          <p:cNvSpPr>
+            <a:spLocks noGrp="1"/>
+          </p:cNvSpPr>
+          <p:nvPr>
+            <p:ph type="title"/>
+          </p:nvPr>
+        </p:nvSpPr>
+        <p:spPr/>
+        <p:txBody>
+          <a:bodyPr/>
+          <a:lstStyle/>
+          <a:p>
+            <a:r>
+              <a:rPr lang="en-US" dirty="0"/>
+              <a:t>Faking tables</a:t>
+            </a:r>
+          </a:p>
+        </p:txBody>
+      </p:sp>
+      <p:sp>
+        <p:nvSpPr>
+          <p:cNvPr id="3" name="Content Placeholder 2"/>
+          <p:cNvSpPr>
+            <a:spLocks noGrp="1"/>
+          </p:cNvSpPr>
+          <p:nvPr>
+            <p:ph idx="1"/>
+          </p:nvPr>
+        </p:nvSpPr>
+        <p:spPr/>
+        <p:txBody>
+          <a:bodyPr>
+            <a:normAutofit fontScale="92500" lnSpcReduction="10000"/>
+          </a:bodyPr>
+          <a:lstStyle/>
+          <a:p>
+            <a:r>
+              <a:rPr lang="en-US" dirty="0"/>
+              <a:t>Procedure:  EXEC </a:t>
+            </a:r>
+            <a:r>
+              <a:rPr lang="en-US" dirty="0" err="1"/>
+              <a:t>tSQLt.FakeTable</a:t>
+            </a:r>
+            <a:r>
+              <a:rPr lang="en-US" dirty="0"/>
+              <a:t> ‘</a:t>
+            </a:r>
+            <a:r>
+              <a:rPr lang="en-US" dirty="0" err="1"/>
+              <a:t>SchemaName.TableName</a:t>
+            </a:r>
+            <a:r>
+              <a:rPr lang="en-US" dirty="0"/>
+              <a:t>’</a:t>
+            </a:r>
+          </a:p>
+          <a:p>
+            <a:r>
+              <a:rPr lang="en-US" dirty="0"/>
+              <a:t>We can get a “clean slate” version of table</a:t>
+            </a:r>
+          </a:p>
+          <a:p>
+            <a:pPr lvl="1"/>
+            <a:r>
+              <a:rPr lang="en-US" dirty="0"/>
+              <a:t>Same columns*</a:t>
+            </a:r>
+          </a:p>
+          <a:p>
+            <a:pPr lvl="1"/>
+            <a:r>
+              <a:rPr lang="en-US" dirty="0"/>
+              <a:t>No data,  no constraints</a:t>
+            </a:r>
+          </a:p>
+          <a:p>
+            <a:pPr lvl="1"/>
+            <a:endParaRPr lang="en-US" dirty="0"/>
+          </a:p>
+          <a:p>
+            <a:r>
+              <a:rPr lang="en-US" dirty="0"/>
+              <a:t>Will use often – breaks ‘coupling’ in one go</a:t>
+            </a:r>
+          </a:p>
+          <a:p>
+            <a:endParaRPr lang="en-US" dirty="0"/>
+          </a:p>
+          <a:p>
+            <a:r>
+              <a:rPr lang="en-US" b="1" dirty="0"/>
+              <a:t>Make sure to run only via </a:t>
+            </a:r>
+            <a:r>
+              <a:rPr lang="en-US" b="1" dirty="0" err="1"/>
+              <a:t>tSQLt.Run</a:t>
+            </a:r>
+            <a:r>
+              <a:rPr lang="en-US" b="1" dirty="0"/>
+              <a:t>* methods – else not automatically undone!</a:t>
+            </a:r>
+          </a:p>
+        </p:txBody>
+      </p:sp>
+    </p:spTree>
+    <p:extLst>
+      <p:ext uri="{BB962C8B-B14F-4D97-AF65-F5344CB8AC3E}">
+        <p14:creationId xmlns:p14="http://schemas.microsoft.com/office/powerpoint/2010/main" val="723964311"/>
+      </p:ext>
+    </p:extLst>
+  </p:cSld>
+  <p:clrMapOvr>
+    <a:masterClrMapping/>
+  </p:clrMapOvr>
+</p:sld>
+</file>
+
+<file path=ppt/slides/slide11.xml><?xml version="1.0" encoding="utf-8"?>
+<p:sld xmlns:a="http://schemas.openxmlformats.org/drawingml/2006/main" xmlns:r="http://schemas.openxmlformats.org/officeDocument/2006/relationships" xmlns:p="http://schemas.openxmlformats.org/presentationml/2006/main">
+  <p:cSld>
+    <p:spTree>
+      <p:nvGrpSpPr>
+        <p:cNvPr id="1" name=""/>
+        <p:cNvGrpSpPr/>
+        <p:nvPr/>
+      </p:nvGrpSpPr>
+      <p:grpSpPr>
+        <a:xfrm>
+          <a:off x="0" y="0"/>
+          <a:ext cx="0" cy="0"/>
+          <a:chOff x="0" y="0"/>
+          <a:chExt cx="0" cy="0"/>
+        </a:xfrm>
+      </p:grpSpPr>
+      <p:sp>
+        <p:nvSpPr>
+          <p:cNvPr id="2" name="Title 1"/>
+          <p:cNvSpPr>
+            <a:spLocks noGrp="1"/>
+          </p:cNvSpPr>
+          <p:nvPr>
+            <p:ph type="title"/>
+          </p:nvPr>
+        </p:nvSpPr>
+        <p:spPr/>
+        <p:txBody>
+          <a:bodyPr/>
+          <a:lstStyle/>
+          <a:p>
+            <a:r>
+              <a:rPr lang="en-US" dirty="0"/>
+              <a:t>Faking Tables II</a:t>
+            </a:r>
+          </a:p>
+        </p:txBody>
+      </p:sp>
+      <p:sp>
+        <p:nvSpPr>
+          <p:cNvPr id="3" name="Content Placeholder 2"/>
+          <p:cNvSpPr>
+            <a:spLocks noGrp="1"/>
+          </p:cNvSpPr>
+          <p:nvPr>
+            <p:ph idx="1"/>
+          </p:nvPr>
+        </p:nvSpPr>
+        <p:spPr/>
+        <p:txBody>
+          <a:bodyPr/>
+          <a:lstStyle/>
+          <a:p>
+            <a:r>
+              <a:rPr lang="en-US" dirty="0"/>
+              <a:t>To the bit about same columns:</a:t>
+            </a:r>
+          </a:p>
+          <a:p>
+            <a:pPr lvl="2"/>
+            <a:r>
+              <a:rPr lang="en-US" dirty="0"/>
+              <a:t>@Identity – whether or not to preserve identity properties of a column should be observed.  Value of 1 preserves them. Default is 0</a:t>
+            </a:r>
+          </a:p>
+          <a:p>
+            <a:pPr lvl="2"/>
+            <a:r>
+              <a:rPr lang="en-US" dirty="0"/>
+              <a:t>@</a:t>
+            </a:r>
+            <a:r>
+              <a:rPr lang="en-US" dirty="0" err="1"/>
+              <a:t>ComputedColumns</a:t>
+            </a:r>
+            <a:r>
+              <a:rPr lang="en-US" dirty="0"/>
+              <a:t> – whether or not to preserve computations. Value of 1 preserves. Default is 0</a:t>
+            </a:r>
+          </a:p>
+          <a:p>
+            <a:pPr lvl="2"/>
+            <a:r>
+              <a:rPr lang="en-US" dirty="0"/>
+              <a:t>@Defaults – if default constraints should be preserved. Value of 1 preserves. Default 0</a:t>
+            </a:r>
+          </a:p>
+          <a:p>
+            <a:pPr lvl="2"/>
+            <a:endParaRPr lang="en-US" dirty="0"/>
+          </a:p>
+        </p:txBody>
+      </p:sp>
+    </p:spTree>
+    <p:extLst>
+      <p:ext uri="{BB962C8B-B14F-4D97-AF65-F5344CB8AC3E}">
+        <p14:creationId xmlns:p14="http://schemas.microsoft.com/office/powerpoint/2010/main" val="1600354876"/>
+      </p:ext>
+    </p:extLst>
+  </p:cSld>
+  <p:clrMapOvr>
+    <a:masterClrMapping/>
+  </p:clrMapOvr>
+</p:sld>
+</file>
+
+<file path=ppt/slides/slide12.xml><?xml version="1.0" encoding="utf-8"?>
+<p:sld xmlns:a="http://schemas.openxmlformats.org/drawingml/2006/main" xmlns:r="http://schemas.openxmlformats.org/officeDocument/2006/relationships" xmlns:p="http://schemas.openxmlformats.org/presentationml/2006/main">
+  <p:cSld>
+    <p:spTree>
+      <p:nvGrpSpPr>
+        <p:cNvPr id="1" name=""/>
+        <p:cNvGrpSpPr/>
+        <p:nvPr/>
+      </p:nvGrpSpPr>
+      <p:grpSpPr>
+        <a:xfrm>
+          <a:off x="0" y="0"/>
+          <a:ext cx="0" cy="0"/>
+          <a:chOff x="0" y="0"/>
+          <a:chExt cx="0" cy="0"/>
+        </a:xfrm>
+      </p:grpSpPr>
+      <p:sp>
+        <p:nvSpPr>
+          <p:cNvPr id="2" name="Title 1"/>
+          <p:cNvSpPr>
+            <a:spLocks noGrp="1"/>
+          </p:cNvSpPr>
+          <p:nvPr>
+            <p:ph type="title"/>
+          </p:nvPr>
+        </p:nvSpPr>
+        <p:spPr/>
+        <p:txBody>
+          <a:bodyPr/>
+          <a:lstStyle/>
+          <a:p>
+            <a:r>
+              <a:rPr lang="en-US" dirty="0"/>
+              <a:t>Testing constraints</a:t>
+            </a:r>
+          </a:p>
+        </p:txBody>
+      </p:sp>
+      <p:sp>
+        <p:nvSpPr>
+          <p:cNvPr id="3" name="Content Placeholder 2"/>
+          <p:cNvSpPr>
+            <a:spLocks noGrp="1"/>
+          </p:cNvSpPr>
+          <p:nvPr>
+            <p:ph idx="1"/>
+          </p:nvPr>
+        </p:nvSpPr>
+        <p:spPr/>
+        <p:txBody>
+          <a:bodyPr/>
+          <a:lstStyle/>
+          <a:p>
+            <a:r>
+              <a:rPr lang="en-US" dirty="0"/>
+              <a:t>First – fake the table</a:t>
+            </a:r>
+          </a:p>
+          <a:p>
+            <a:endParaRPr lang="en-US" dirty="0"/>
+          </a:p>
+          <a:p>
+            <a:r>
+              <a:rPr lang="en-US" dirty="0"/>
+              <a:t>Then:</a:t>
+            </a:r>
+          </a:p>
+          <a:p>
+            <a:pPr lvl="1"/>
+            <a:r>
+              <a:rPr lang="en-US" dirty="0"/>
+              <a:t>EXEC </a:t>
+            </a:r>
+            <a:r>
+              <a:rPr lang="en-US" dirty="0" err="1"/>
+              <a:t>tSQLt.ApplyConstraint</a:t>
+            </a:r>
+            <a:r>
+              <a:rPr lang="en-US" dirty="0"/>
+              <a:t> ‘</a:t>
+            </a:r>
+            <a:r>
+              <a:rPr lang="en-US" dirty="0" err="1"/>
+              <a:t>schemaName.TestClassName</a:t>
+            </a:r>
+            <a:r>
+              <a:rPr lang="en-US" dirty="0"/>
+              <a:t>’, ‘</a:t>
+            </a:r>
+            <a:r>
+              <a:rPr lang="en-US" dirty="0" err="1"/>
+              <a:t>Constraint_Name</a:t>
+            </a:r>
+            <a:r>
+              <a:rPr lang="en-US" dirty="0"/>
+              <a:t>’</a:t>
+            </a:r>
+          </a:p>
+        </p:txBody>
+      </p:sp>
+    </p:spTree>
+    <p:extLst>
+      <p:ext uri="{BB962C8B-B14F-4D97-AF65-F5344CB8AC3E}">
+        <p14:creationId xmlns:p14="http://schemas.microsoft.com/office/powerpoint/2010/main" val="3221278711"/>
+      </p:ext>
+    </p:extLst>
+  </p:cSld>
+  <p:clrMapOvr>
+    <a:masterClrMapping/>
+  </p:clrMapOvr>
+</p:sld>
+</file>
+
+<file path=ppt/slides/slide13.xml><?xml version="1.0" encoding="utf-8"?>
+<p:sld xmlns:a="http://schemas.openxmlformats.org/drawingml/2006/main" xmlns:r="http://schemas.openxmlformats.org/officeDocument/2006/relationships" xmlns:p="http://schemas.openxmlformats.org/presentationml/2006/main">
+  <p:cSld>
+    <p:spTree>
+      <p:nvGrpSpPr>
+        <p:cNvPr id="1" name=""/>
+        <p:cNvGrpSpPr/>
+        <p:nvPr/>
+      </p:nvGrpSpPr>
+      <p:grpSpPr>
+        <a:xfrm>
+          <a:off x="0" y="0"/>
+          <a:ext cx="0" cy="0"/>
+          <a:chOff x="0" y="0"/>
+          <a:chExt cx="0" cy="0"/>
+        </a:xfrm>
+      </p:grpSpPr>
+      <p:sp>
+        <p:nvSpPr>
+          <p:cNvPr id="2" name="Title 1"/>
+          <p:cNvSpPr>
+            <a:spLocks noGrp="1"/>
+          </p:cNvSpPr>
+          <p:nvPr>
+            <p:ph type="title"/>
+          </p:nvPr>
+        </p:nvSpPr>
+        <p:spPr/>
+        <p:txBody>
+          <a:bodyPr/>
+          <a:lstStyle/>
+          <a:p>
+            <a:r>
+              <a:rPr lang="en-US" dirty="0"/>
+              <a:t>Testing Triggers</a:t>
+            </a:r>
+          </a:p>
+        </p:txBody>
+      </p:sp>
+      <p:sp>
+        <p:nvSpPr>
+          <p:cNvPr id="3" name="Content Placeholder 2"/>
+          <p:cNvSpPr>
+            <a:spLocks noGrp="1"/>
+          </p:cNvSpPr>
+          <p:nvPr>
+            <p:ph idx="1"/>
+          </p:nvPr>
+        </p:nvSpPr>
+        <p:spPr/>
+        <p:txBody>
+          <a:bodyPr/>
+          <a:lstStyle/>
+          <a:p>
+            <a:r>
+              <a:rPr lang="en-US" dirty="0"/>
+              <a:t>Depending on the trigger, may need to fake multiple tables</a:t>
+            </a:r>
+          </a:p>
+          <a:p>
+            <a:endParaRPr lang="en-US" dirty="0"/>
+          </a:p>
+          <a:p>
+            <a:endParaRPr lang="en-US" dirty="0"/>
+          </a:p>
+          <a:p>
+            <a:r>
+              <a:rPr lang="en-US" dirty="0"/>
+              <a:t>EXEC </a:t>
+            </a:r>
+            <a:r>
+              <a:rPr lang="en-US" dirty="0" err="1"/>
+              <a:t>tSQLt.ApplyTrigger</a:t>
+            </a:r>
+            <a:r>
+              <a:rPr lang="en-US" dirty="0"/>
+              <a:t> ‘</a:t>
+            </a:r>
+            <a:r>
+              <a:rPr lang="en-US" dirty="0" err="1"/>
+              <a:t>schemaName.TableName</a:t>
+            </a:r>
+            <a:r>
+              <a:rPr lang="en-US" dirty="0"/>
+              <a:t>’, ‘</a:t>
+            </a:r>
+            <a:r>
+              <a:rPr lang="en-US" dirty="0" err="1"/>
+              <a:t>triggerName</a:t>
+            </a:r>
+            <a:r>
+              <a:rPr lang="en-US" dirty="0"/>
+              <a:t>’ </a:t>
+            </a:r>
+          </a:p>
+        </p:txBody>
+      </p:sp>
+    </p:spTree>
+    <p:extLst>
+      <p:ext uri="{BB962C8B-B14F-4D97-AF65-F5344CB8AC3E}">
+        <p14:creationId xmlns:p14="http://schemas.microsoft.com/office/powerpoint/2010/main" val="893636569"/>
+      </p:ext>
+    </p:extLst>
+  </p:cSld>
+  <p:clrMapOvr>
+    <a:masterClrMapping/>
+  </p:clrMapOvr>
+</p:sld>
+</file>
+
+<file path=ppt/slides/slide14.xml><?xml version="1.0" encoding="utf-8"?>
+<p:sld xmlns:a="http://schemas.openxmlformats.org/drawingml/2006/main" xmlns:r="http://schemas.openxmlformats.org/officeDocument/2006/relationships" xmlns:p="http://schemas.openxmlformats.org/presentationml/2006/main">
+  <p:cSld>
+    <p:spTree>
+      <p:nvGrpSpPr>
+        <p:cNvPr id="1" name=""/>
+        <p:cNvGrpSpPr/>
+        <p:nvPr/>
+      </p:nvGrpSpPr>
+      <p:grpSpPr>
+        <a:xfrm>
+          <a:off x="0" y="0"/>
+          <a:ext cx="0" cy="0"/>
+          <a:chOff x="0" y="0"/>
+          <a:chExt cx="0" cy="0"/>
+        </a:xfrm>
+      </p:grpSpPr>
+      <p:sp>
+        <p:nvSpPr>
+          <p:cNvPr id="2" name="Title 1"/>
+          <p:cNvSpPr>
+            <a:spLocks noGrp="1"/>
+          </p:cNvSpPr>
+          <p:nvPr>
+            <p:ph type="title"/>
+          </p:nvPr>
+        </p:nvSpPr>
+        <p:spPr/>
+        <p:txBody>
+          <a:bodyPr/>
+          <a:lstStyle/>
+          <a:p>
+            <a:r>
+              <a:rPr lang="en-US" dirty="0"/>
+              <a:t>Resources &amp; Reading</a:t>
+            </a:r>
+          </a:p>
+        </p:txBody>
+      </p:sp>
+      <p:sp>
+        <p:nvSpPr>
+          <p:cNvPr id="3" name="Content Placeholder 2"/>
+          <p:cNvSpPr>
+            <a:spLocks noGrp="1"/>
+          </p:cNvSpPr>
+          <p:nvPr>
+            <p:ph idx="1"/>
+          </p:nvPr>
+        </p:nvSpPr>
+        <p:spPr/>
+        <p:txBody>
+          <a:bodyPr/>
+          <a:lstStyle/>
+          <a:p>
+            <a:r>
+              <a:rPr lang="en-US" dirty="0"/>
+              <a:t>Project webpage: </a:t>
+            </a:r>
+            <a:r>
+              <a:rPr lang="en-US" dirty="0">
+                <a:hlinkClick r:id="rId2"/>
+              </a:rPr>
+              <a:t>http://tsqlt.org/</a:t>
+            </a:r>
+            <a:r>
+              <a:rPr lang="en-US" dirty="0"/>
+              <a:t> </a:t>
+            </a:r>
+          </a:p>
+          <a:p>
+            <a:r>
+              <a:rPr lang="en-US" dirty="0"/>
+              <a:t>Talk by Sebastian </a:t>
+            </a:r>
+            <a:r>
+              <a:rPr lang="en-US" dirty="0" err="1"/>
+              <a:t>Meine</a:t>
+            </a:r>
+            <a:r>
+              <a:rPr lang="en-US" dirty="0"/>
+              <a:t> (Co-author) and Steve Jones</a:t>
+            </a:r>
+          </a:p>
+          <a:p>
+            <a:pPr lvl="1"/>
+            <a:r>
+              <a:rPr lang="en-US" dirty="0">
+                <a:hlinkClick r:id="rId3"/>
+              </a:rPr>
+              <a:t>https://www.red-gate.com/library/unit-testing-in-sql-server-with-tsqlt</a:t>
+            </a:r>
+            <a:r>
+              <a:rPr lang="en-US" dirty="0"/>
+              <a:t> </a:t>
+            </a:r>
+          </a:p>
+          <a:p>
+            <a:r>
+              <a:rPr lang="en-US" dirty="0"/>
+              <a:t>Refactoring Databases: Evolutionary Database Design</a:t>
+            </a:r>
+          </a:p>
+          <a:p>
+            <a:pPr lvl="1"/>
+            <a:r>
+              <a:rPr lang="en-US" dirty="0"/>
+              <a:t>By Scott J. Ambler and </a:t>
+            </a:r>
+            <a:r>
+              <a:rPr lang="en-US" dirty="0" err="1"/>
+              <a:t>Pramod</a:t>
+            </a:r>
+            <a:r>
+              <a:rPr lang="en-US" dirty="0"/>
+              <a:t> J. </a:t>
+            </a:r>
+            <a:r>
+              <a:rPr lang="en-US" dirty="0" err="1"/>
+              <a:t>Sadalage</a:t>
+            </a:r>
+            <a:endParaRPr lang="en-US" dirty="0"/>
+          </a:p>
+          <a:p>
+            <a:pPr lvl="1"/>
+            <a:r>
+              <a:rPr lang="en-US" dirty="0"/>
+              <a:t>Companion site: </a:t>
+            </a:r>
+            <a:r>
+              <a:rPr lang="en-US" dirty="0">
+                <a:hlinkClick r:id="rId4"/>
+              </a:rPr>
+              <a:t>http://databaserefactoring.com/</a:t>
+            </a:r>
+            <a:r>
+              <a:rPr lang="en-US" dirty="0"/>
+              <a:t> </a:t>
+            </a:r>
+          </a:p>
+          <a:p>
+            <a:r>
+              <a:rPr lang="en-US" dirty="0"/>
+              <a:t>Simple Talk articles on DLM &amp; DB testing</a:t>
+            </a:r>
+          </a:p>
+        </p:txBody>
+      </p:sp>
+    </p:spTree>
+    <p:extLst>
+      <p:ext uri="{BB962C8B-B14F-4D97-AF65-F5344CB8AC3E}">
+        <p14:creationId xmlns:p14="http://schemas.microsoft.com/office/powerpoint/2010/main" val="2129555590"/>
+      </p:ext>
+    </p:extLst>
+  </p:cSld>
+  <p:clrMapOvr>
+    <a:masterClrMapping/>
+  </p:clrMapOvr>
+</p:sld>
+</file>
+
+<file path=ppt/slides/slide15.xml><?xml version="1.0" encoding="utf-8"?>
+<p:sld xmlns:a="http://schemas.openxmlformats.org/drawingml/2006/main" xmlns:r="http://schemas.openxmlformats.org/officeDocument/2006/relationships" xmlns:p="http://schemas.openxmlformats.org/presentationml/2006/main">
+  <p:cSld>
+    <p:spTree>
+      <p:nvGrpSpPr>
+        <p:cNvPr id="1" name=""/>
+        <p:cNvGrpSpPr/>
+        <p:nvPr/>
+      </p:nvGrpSpPr>
+      <p:grpSpPr>
+        <a:xfrm>
+          <a:off x="0" y="0"/>
+          <a:ext cx="0" cy="0"/>
+          <a:chOff x="0" y="0"/>
+          <a:chExt cx="0" cy="0"/>
+        </a:xfrm>
+      </p:grpSpPr>
+      <p:sp>
+        <p:nvSpPr>
+          <p:cNvPr id="2" name="Title 1"/>
+          <p:cNvSpPr>
+            <a:spLocks noGrp="1"/>
+          </p:cNvSpPr>
+          <p:nvPr>
+            <p:ph type="ctrTitle"/>
+          </p:nvPr>
+        </p:nvSpPr>
+        <p:spPr/>
+        <p:txBody>
+          <a:bodyPr/>
+          <a:lstStyle/>
+          <a:p>
+            <a:r>
+              <a:rPr lang="en-US" dirty="0"/>
+              <a:t>Questions?</a:t>
+            </a:r>
+          </a:p>
+        </p:txBody>
+      </p:sp>
+      <p:sp>
+        <p:nvSpPr>
+          <p:cNvPr id="3" name="Subtitle 2"/>
+          <p:cNvSpPr>
+            <a:spLocks noGrp="1"/>
+          </p:cNvSpPr>
+          <p:nvPr>
+            <p:ph type="subTitle" idx="1"/>
+          </p:nvPr>
+        </p:nvSpPr>
+        <p:spPr/>
+        <p:txBody>
+          <a:bodyPr/>
+          <a:lstStyle/>
+          <a:p>
+            <a:endParaRPr lang="en-US"/>
+          </a:p>
+        </p:txBody>
+      </p:sp>
+    </p:spTree>
+    <p:extLst>
+      <p:ext uri="{BB962C8B-B14F-4D97-AF65-F5344CB8AC3E}">
+        <p14:creationId xmlns:p14="http://schemas.microsoft.com/office/powerpoint/2010/main" val="2641732441"/>
+      </p:ext>
+    </p:extLst>
+  </p:cSld>
+  <p:clrMapOvr>
+    <a:masterClrMapping/>
+  </p:clrMapOvr>
+</p:sld>
+</file>
+
+<file path=ppt/slides/slide16.xml><?xml version="1.0" encoding="utf-8"?>
+<p:sld xmlns:a="http://schemas.openxmlformats.org/drawingml/2006/main" xmlns:r="http://schemas.openxmlformats.org/officeDocument/2006/relationships" xmlns:p="http://schemas.openxmlformats.org/presentationml/2006/main">
+  <p:cSld>
+    <p:spTree>
+      <p:nvGrpSpPr>
+        <p:cNvPr id="1" name=""/>
+        <p:cNvGrpSpPr/>
+        <p:nvPr/>
+      </p:nvGrpSpPr>
+      <p:grpSpPr>
+        <a:xfrm>
+          <a:off x="0" y="0"/>
+          <a:ext cx="0" cy="0"/>
+          <a:chOff x="0" y="0"/>
+          <a:chExt cx="0" cy="0"/>
+        </a:xfrm>
+      </p:grpSpPr>
+      <p:sp>
+        <p:nvSpPr>
+          <p:cNvPr id="2" name="Title 1"/>
+          <p:cNvSpPr>
+            <a:spLocks noGrp="1"/>
+          </p:cNvSpPr>
+          <p:nvPr>
+            <p:ph type="title"/>
+          </p:nvPr>
+        </p:nvSpPr>
+        <p:spPr/>
+        <p:txBody>
+          <a:bodyPr/>
+          <a:lstStyle/>
+          <a:p>
+            <a:r>
+              <a:rPr lang="en-US" dirty="0"/>
+              <a:t>Tips</a:t>
+            </a:r>
+          </a:p>
+        </p:txBody>
+      </p:sp>
+      <p:sp>
+        <p:nvSpPr>
+          <p:cNvPr id="3" name="Content Placeholder 2"/>
+          <p:cNvSpPr>
+            <a:spLocks noGrp="1"/>
+          </p:cNvSpPr>
+          <p:nvPr>
+            <p:ph idx="1"/>
+          </p:nvPr>
+        </p:nvSpPr>
+        <p:spPr/>
+        <p:txBody>
+          <a:bodyPr/>
+          <a:lstStyle/>
+          <a:p>
+            <a:r>
+              <a:rPr lang="en-US" dirty="0"/>
+              <a:t>Take advantage of SSMS query shortcuts</a:t>
+            </a:r>
+          </a:p>
+          <a:p>
+            <a:pPr lvl="1"/>
+            <a:r>
+              <a:rPr lang="en-US" dirty="0"/>
+              <a:t>Tools &gt; Options &gt; expand  “Keyboard” &gt; Query Shortcuts</a:t>
+            </a:r>
+          </a:p>
+          <a:p>
+            <a:pPr lvl="1"/>
+            <a:r>
+              <a:rPr lang="en-US" dirty="0"/>
+              <a:t>For instance:</a:t>
+            </a:r>
+          </a:p>
+          <a:p>
+            <a:pPr lvl="2"/>
+            <a:r>
+              <a:rPr lang="en-US" dirty="0"/>
+              <a:t>EXEC </a:t>
+            </a:r>
+            <a:r>
+              <a:rPr lang="en-US" dirty="0" err="1"/>
+              <a:t>tSQLt.RunAll</a:t>
+            </a:r>
+            <a:endParaRPr lang="en-US" dirty="0"/>
+          </a:p>
+          <a:p>
+            <a:pPr lvl="2"/>
+            <a:r>
+              <a:rPr lang="en-US" dirty="0"/>
+              <a:t>EXEC </a:t>
+            </a:r>
+            <a:r>
+              <a:rPr lang="en-US" dirty="0" err="1"/>
+              <a:t>tSQLt.Run</a:t>
+            </a:r>
+            <a:endParaRPr lang="en-US" dirty="0"/>
+          </a:p>
+        </p:txBody>
+      </p:sp>
+    </p:spTree>
+    <p:extLst>
+      <p:ext uri="{BB962C8B-B14F-4D97-AF65-F5344CB8AC3E}">
+        <p14:creationId xmlns:p14="http://schemas.microsoft.com/office/powerpoint/2010/main" val="2902962683"/>
+      </p:ext>
+    </p:extLst>
+  </p:cSld>
+  <p:clrMapOvr>
+    <a:masterClrMapping/>
+  </p:clrMapOvr>
+</p:sld>
+</file>
+
 <file path=ppt/slides/slide2.xml><?xml version="1.0" encoding="utf-8"?>
 <p:sld xmlns:a="http://schemas.openxmlformats.org/drawingml/2006/main" xmlns:r="http://schemas.openxmlformats.org/officeDocument/2006/relationships" xmlns:p="http://schemas.openxmlformats.org/presentationml/2006/main">
   <p:cSld>
@@ -4215,13 +5035,7 @@
           <a:p>
             <a:r>
               <a:rPr lang="en-US" dirty="0"/>
-              <a:t>Coupling of code abstractions with DB</a:t>
-            </a:r>
-          </a:p>
-          <a:p>
-            <a:r>
-              <a:rPr lang="en-US" dirty="0"/>
-              <a:t>Data people may not be code people</a:t>
+              <a:t>Traditional approaches: Coupling of code abstractions with DB</a:t>
             </a:r>
           </a:p>
           <a:p>
@@ -4236,6 +5050,12 @@
             <a:r>
               <a:rPr lang="en-US" dirty="0"/>
               <a:t>, tables</a:t>
+            </a:r>
+          </a:p>
+          <a:p>
+            <a:r>
+              <a:rPr lang="en-US" dirty="0"/>
+              <a:t>Data people may not be code people</a:t>
             </a:r>
           </a:p>
           <a:p>
@@ -4330,7 +5150,29 @@
             <a:pPr lvl="1"/>
             <a:r>
               <a:rPr lang="en-US" dirty="0"/>
-              <a:t>Generally not existing data, no.  Prefer ensuring only good data makes it in</a:t>
+              <a:t>This presentation: Prefer ensuring only good data makes it in</a:t>
+            </a:r>
+          </a:p>
+          <a:p>
+            <a:pPr lvl="1"/>
+            <a:r>
+              <a:rPr lang="en-US" dirty="0"/>
+              <a:t>Data quality important,  enough for own topic. (Slightly more integration)</a:t>
+            </a:r>
+          </a:p>
+          <a:p>
+            <a:pPr lvl="1"/>
+            <a:r>
+              <a:rPr lang="en-US" dirty="0"/>
+              <a:t>By all means, </a:t>
+            </a:r>
+            <a:r>
+              <a:rPr lang="en-US" dirty="0" err="1"/>
+              <a:t>tSQLt</a:t>
+            </a:r>
+            <a:r>
+              <a:rPr lang="en-US" dirty="0"/>
+              <a:t> may be of use to you (standard test functions)</a:t>
             </a:r>
           </a:p>
           <a:p>

</xml_diff>

<commit_message>
Additional example for SpyProcedure
Add an example for SpyProcedure, and several updates to slides
</commit_message>
<xml_diff>
--- a/tSQLt-Talk.pptx
+++ b/tSQLt-Talk.pptx
@@ -5,25 +5,28 @@
     <p:sldMasterId id="2147483696" r:id="rId1"/>
   </p:sldMasterIdLst>
   <p:notesMasterIdLst>
-    <p:notesMasterId r:id="rId18"/>
+    <p:notesMasterId r:id="rId21"/>
   </p:notesMasterIdLst>
   <p:sldIdLst>
     <p:sldId id="256" r:id="rId2"/>
     <p:sldId id="257" r:id="rId3"/>
-    <p:sldId id="258" r:id="rId4"/>
-    <p:sldId id="259" r:id="rId5"/>
-    <p:sldId id="260" r:id="rId6"/>
-    <p:sldId id="261" r:id="rId7"/>
-    <p:sldId id="262" r:id="rId8"/>
-    <p:sldId id="263" r:id="rId9"/>
-    <p:sldId id="264" r:id="rId10"/>
-    <p:sldId id="266" r:id="rId11"/>
-    <p:sldId id="267" r:id="rId12"/>
-    <p:sldId id="270" r:id="rId13"/>
-    <p:sldId id="271" r:id="rId14"/>
-    <p:sldId id="265" r:id="rId15"/>
-    <p:sldId id="268" r:id="rId16"/>
-    <p:sldId id="269" r:id="rId17"/>
+    <p:sldId id="273" r:id="rId4"/>
+    <p:sldId id="258" r:id="rId5"/>
+    <p:sldId id="259" r:id="rId6"/>
+    <p:sldId id="260" r:id="rId7"/>
+    <p:sldId id="261" r:id="rId8"/>
+    <p:sldId id="262" r:id="rId9"/>
+    <p:sldId id="263" r:id="rId10"/>
+    <p:sldId id="264" r:id="rId11"/>
+    <p:sldId id="266" r:id="rId12"/>
+    <p:sldId id="267" r:id="rId13"/>
+    <p:sldId id="270" r:id="rId14"/>
+    <p:sldId id="271" r:id="rId15"/>
+    <p:sldId id="272" r:id="rId16"/>
+    <p:sldId id="274" r:id="rId17"/>
+    <p:sldId id="265" r:id="rId18"/>
+    <p:sldId id="268" r:id="rId19"/>
+    <p:sldId id="269" r:id="rId20"/>
   </p:sldIdLst>
   <p:sldSz cx="12192000" cy="6858000"/>
   <p:notesSz cx="6858000" cy="9144000"/>
@@ -212,7 +215,7 @@
           <a:p>
             <a:fld id="{EAEDC630-68ED-486F-A3AF-CCFE83723F50}" type="datetimeFigureOut">
               <a:rPr lang="en-US" smtClean="0"/>
-              <a:t>9/27/2016</a:t>
+              <a:t>9/29/2016</a:t>
             </a:fld>
             <a:endParaRPr lang="en-US"/>
           </a:p>
@@ -547,7 +550,7 @@
           <a:p>
             <a:fld id="{69CB7401-2612-49E9-88EF-CB9F3AAEF208}" type="slidenum">
               <a:rPr lang="en-US" smtClean="0"/>
-              <a:t>5</a:t>
+              <a:t>6</a:t>
             </a:fld>
             <a:endParaRPr lang="en-US"/>
           </a:p>
@@ -662,7 +665,7 @@
           <a:p>
             <a:fld id="{69CB7401-2612-49E9-88EF-CB9F3AAEF208}" type="slidenum">
               <a:rPr lang="en-US" smtClean="0"/>
-              <a:t>6</a:t>
+              <a:t>7</a:t>
             </a:fld>
             <a:endParaRPr lang="en-US"/>
           </a:p>
@@ -758,7 +761,7 @@
           <a:p>
             <a:fld id="{69CB7401-2612-49E9-88EF-CB9F3AAEF208}" type="slidenum">
               <a:rPr lang="en-US" smtClean="0"/>
-              <a:t>7</a:t>
+              <a:t>8</a:t>
             </a:fld>
             <a:endParaRPr lang="en-US"/>
           </a:p>
@@ -850,7 +853,7 @@
           <a:p>
             <a:fld id="{69CB7401-2612-49E9-88EF-CB9F3AAEF208}" type="slidenum">
               <a:rPr lang="en-US" smtClean="0"/>
-              <a:t>8</a:t>
+              <a:t>9</a:t>
             </a:fld>
             <a:endParaRPr lang="en-US"/>
           </a:p>
@@ -937,7 +940,7 @@
           <a:p>
             <a:fld id="{69CB7401-2612-49E9-88EF-CB9F3AAEF208}" type="slidenum">
               <a:rPr lang="en-US" smtClean="0"/>
-              <a:t>9</a:t>
+              <a:t>10</a:t>
             </a:fld>
             <a:endParaRPr lang="en-US"/>
           </a:p>
@@ -1111,7 +1114,7 @@
           <a:p>
             <a:fld id="{CA430C0A-5464-4FE4-84EB-FF9C94016DF4}" type="datetimeFigureOut">
               <a:rPr lang="en-US" dirty="0"/>
-              <a:t>9/27/2016</a:t>
+              <a:t>9/29/2016</a:t>
             </a:fld>
             <a:endParaRPr lang="en-US" dirty="0"/>
           </a:p>
@@ -1277,7 +1280,7 @@
           <a:p>
             <a:fld id="{E9F9C37B-1D36-470B-8223-D6C91242EC14}" type="datetimeFigureOut">
               <a:rPr lang="en-US" dirty="0"/>
-              <a:t>9/27/2016</a:t>
+              <a:t>9/29/2016</a:t>
             </a:fld>
             <a:endParaRPr lang="en-US" dirty="0"/>
           </a:p>
@@ -1452,7 +1455,7 @@
           <a:p>
             <a:fld id="{67C6F52A-A82B-47A2-A83A-8C4C91F2D59F}" type="datetimeFigureOut">
               <a:rPr lang="en-US" dirty="0"/>
-              <a:t>9/27/2016</a:t>
+              <a:t>9/29/2016</a:t>
             </a:fld>
             <a:endParaRPr lang="en-US" dirty="0"/>
           </a:p>
@@ -1617,7 +1620,7 @@
           <a:p>
             <a:fld id="{F070A7B3-6521-4DCA-87E5-044747A908C1}" type="datetimeFigureOut">
               <a:rPr lang="en-US" dirty="0"/>
-              <a:t>9/27/2016</a:t>
+              <a:t>9/29/2016</a:t>
             </a:fld>
             <a:endParaRPr lang="en-US" dirty="0"/>
           </a:p>
@@ -1873,7 +1876,7 @@
           <a:p>
             <a:fld id="{360C6404-AD6E-4860-8E75-697CA40B95DA}" type="datetimeFigureOut">
               <a:rPr lang="en-US" dirty="0"/>
-              <a:t>9/27/2016</a:t>
+              <a:t>9/29/2016</a:t>
             </a:fld>
             <a:endParaRPr lang="en-US" dirty="0"/>
           </a:p>
@@ -2101,7 +2104,7 @@
           <a:p>
             <a:fld id="{AB134690-1557-4C89-A502-4959FE7FAD70}" type="datetimeFigureOut">
               <a:rPr lang="en-US" dirty="0"/>
-              <a:t>9/27/2016</a:t>
+              <a:t>9/29/2016</a:t>
             </a:fld>
             <a:endParaRPr lang="en-US" dirty="0"/>
           </a:p>
@@ -2451,7 +2454,7 @@
           <a:p>
             <a:fld id="{4F7D4976-E339-4826-83B7-FBD03F55ECF8}" type="datetimeFigureOut">
               <a:rPr lang="en-US" dirty="0"/>
-              <a:t>9/27/2016</a:t>
+              <a:t>9/29/2016</a:t>
             </a:fld>
             <a:endParaRPr lang="en-US" dirty="0"/>
           </a:p>
@@ -2587,7 +2590,7 @@
           <a:p>
             <a:fld id="{E1037C31-9E7A-4F99-8774-A0E530DE1A42}" type="datetimeFigureOut">
               <a:rPr lang="en-US" dirty="0"/>
-              <a:t>9/27/2016</a:t>
+              <a:t>9/29/2016</a:t>
             </a:fld>
             <a:endParaRPr lang="en-US" dirty="0"/>
           </a:p>
@@ -2677,7 +2680,7 @@
           <a:p>
             <a:fld id="{C278504F-A551-4DE0-9316-4DCD1D8CC752}" type="datetimeFigureOut">
               <a:rPr lang="en-US" dirty="0"/>
-              <a:t>9/27/2016</a:t>
+              <a:t>9/29/2016</a:t>
             </a:fld>
             <a:endParaRPr lang="en-US" dirty="0"/>
           </a:p>
@@ -3029,7 +3032,7 @@
           <a:p>
             <a:fld id="{D1BE4249-C0D0-4B06-8692-E8BB871AF643}" type="datetimeFigureOut">
               <a:rPr lang="en-US" dirty="0"/>
-              <a:t>9/27/2016</a:t>
+              <a:t>9/29/2016</a:t>
             </a:fld>
             <a:endParaRPr lang="en-US" dirty="0"/>
           </a:p>
@@ -3342,7 +3345,7 @@
           <a:p>
             <a:fld id="{042B0DB6-F5C7-45FB-8CF3-31B45F9C2DAC}" type="datetimeFigureOut">
               <a:rPr lang="en-US" dirty="0"/>
-              <a:t>9/27/2016</a:t>
+              <a:t>9/29/2016</a:t>
             </a:fld>
             <a:endParaRPr lang="en-US" dirty="0"/>
           </a:p>
@@ -3581,7 +3584,7 @@
           <a:p>
             <a:fld id="{1160EA64-D806-43AC-9DF2-F8C432F32B4C}" type="datetimeFigureOut">
               <a:rPr lang="en-US" dirty="0"/>
-              <a:t>9/27/2016</a:t>
+              <a:t>9/29/2016</a:t>
             </a:fld>
             <a:endParaRPr lang="en-US" dirty="0"/>
           </a:p>
@@ -4134,7 +4137,7 @@
           <a:p>
             <a:r>
               <a:rPr lang="en-US" dirty="0"/>
-              <a:t>Faking tables</a:t>
+              <a:t>Running Tests</a:t>
             </a:r>
           </a:p>
         </p:txBody>
@@ -4151,18 +4154,49 @@
         </p:nvSpPr>
         <p:spPr/>
         <p:txBody>
-          <a:bodyPr>
-            <a:normAutofit fontScale="92500" lnSpcReduction="10000"/>
-          </a:bodyPr>
-          <a:lstStyle/>
-          <a:p>
-            <a:r>
-              <a:rPr lang="en-US" dirty="0"/>
-              <a:t>Procedure:  EXEC </a:t>
+          <a:bodyPr/>
+          <a:lstStyle/>
+          <a:p>
+            <a:r>
+              <a:rPr lang="en-US" dirty="0"/>
+              <a:t>Several options</a:t>
+            </a:r>
+          </a:p>
+          <a:p>
+            <a:pPr lvl="1"/>
+            <a:r>
+              <a:rPr lang="en-US" dirty="0"/>
+              <a:t>Run them all</a:t>
+            </a:r>
+          </a:p>
+          <a:p>
+            <a:pPr lvl="2"/>
+            <a:r>
+              <a:rPr lang="en-US" dirty="0"/>
+              <a:t>EXEC </a:t>
             </a:r>
             <a:r>
               <a:rPr lang="en-US" dirty="0" err="1"/>
-              <a:t>tSQLt.FakeTable</a:t>
+              <a:t>tSQLt.RunAll</a:t>
+            </a:r>
+            <a:endParaRPr lang="en-US" dirty="0"/>
+          </a:p>
+          <a:p>
+            <a:pPr lvl="1"/>
+            <a:r>
+              <a:rPr lang="en-US" dirty="0"/>
+              <a:t>Run one class</a:t>
+            </a:r>
+          </a:p>
+          <a:p>
+            <a:pPr lvl="2"/>
+            <a:r>
+              <a:rPr lang="en-US" dirty="0"/>
+              <a:t>EXEC </a:t>
+            </a:r>
+            <a:r>
+              <a:rPr lang="en-US" dirty="0" err="1"/>
+              <a:t>tSQLt.Run</a:t>
             </a:r>
             <a:r>
               <a:rPr lang="en-US" dirty="0"/>
@@ -4170,7 +4204,7 @@
             </a:r>
             <a:r>
               <a:rPr lang="en-US" dirty="0" err="1"/>
-              <a:t>SchemaName.TableName</a:t>
+              <a:t>testClassName</a:t>
             </a:r>
             <a:r>
               <a:rPr lang="en-US" dirty="0"/>
@@ -4178,50 +4212,40 @@
             </a:r>
           </a:p>
           <a:p>
-            <a:r>
-              <a:rPr lang="en-US" dirty="0"/>
-              <a:t>We can get a “clean slate” version of table</a:t>
-            </a:r>
-          </a:p>
-          <a:p>
             <a:pPr lvl="1"/>
             <a:r>
               <a:rPr lang="en-US" dirty="0"/>
-              <a:t>Same columns*</a:t>
-            </a:r>
-          </a:p>
-          <a:p>
-            <a:pPr lvl="1"/>
-            <a:r>
-              <a:rPr lang="en-US" dirty="0"/>
-              <a:t>No data,  no constraints</a:t>
-            </a:r>
-          </a:p>
-          <a:p>
-            <a:pPr lvl="1"/>
-            <a:endParaRPr lang="en-US" dirty="0"/>
-          </a:p>
-          <a:p>
-            <a:r>
-              <a:rPr lang="en-US" dirty="0"/>
-              <a:t>Will use often – breaks ‘coupling’ in one go</a:t>
-            </a:r>
-          </a:p>
-          <a:p>
-            <a:endParaRPr lang="en-US" dirty="0"/>
-          </a:p>
-          <a:p>
-            <a:r>
-              <a:rPr lang="en-US" b="1" dirty="0"/>
-              <a:t>Make sure to run only via </a:t>
-            </a:r>
-            <a:r>
-              <a:rPr lang="en-US" b="1" dirty="0" err="1"/>
+              <a:t>Run one test</a:t>
+            </a:r>
+          </a:p>
+          <a:p>
+            <a:pPr lvl="2"/>
+            <a:r>
+              <a:rPr lang="en-US" dirty="0"/>
+              <a:t>EXEC </a:t>
+            </a:r>
+            <a:r>
+              <a:rPr lang="en-US" dirty="0" err="1"/>
               <a:t>tSQLt.Run</a:t>
             </a:r>
             <a:r>
-              <a:rPr lang="en-US" b="1" dirty="0"/>
-              <a:t>* methods – else not automatically undone!</a:t>
+              <a:rPr lang="en-US" dirty="0"/>
+              <a:t> ‘</a:t>
+            </a:r>
+            <a:r>
+              <a:rPr lang="en-US" dirty="0" err="1"/>
+              <a:t>testClassName</a:t>
+            </a:r>
+            <a:r>
+              <a:rPr lang="en-US" dirty="0"/>
+              <a:t>.[Test full name]’</a:t>
+            </a:r>
+          </a:p>
+          <a:p>
+            <a:pPr lvl="2"/>
+            <a:r>
+              <a:rPr lang="en-US" dirty="0"/>
+              <a:t>Repeated calls without arguments will run previous test</a:t>
             </a:r>
           </a:p>
         </p:txBody>
@@ -4229,7 +4253,7 @@
     </p:spTree>
     <p:extLst>
       <p:ext uri="{BB962C8B-B14F-4D97-AF65-F5344CB8AC3E}">
-        <p14:creationId xmlns:p14="http://schemas.microsoft.com/office/powerpoint/2010/main" val="723964311"/>
+        <p14:creationId xmlns:p14="http://schemas.microsoft.com/office/powerpoint/2010/main" val="1870860601"/>
       </p:ext>
     </p:extLst>
   </p:cSld>
@@ -4273,7 +4297,7 @@
           <a:p>
             <a:r>
               <a:rPr lang="en-US" dirty="0"/>
-              <a:t>Faking Tables II</a:t>
+              <a:t>Faking tables</a:t>
             </a:r>
           </a:p>
         </p:txBody>
@@ -4290,53 +4314,85 @@
         </p:nvSpPr>
         <p:spPr/>
         <p:txBody>
-          <a:bodyPr/>
-          <a:lstStyle/>
-          <a:p>
-            <a:r>
-              <a:rPr lang="en-US" dirty="0"/>
-              <a:t>To the bit about same columns:</a:t>
-            </a:r>
-          </a:p>
-          <a:p>
-            <a:pPr lvl="2"/>
-            <a:r>
-              <a:rPr lang="en-US" dirty="0"/>
-              <a:t>@Identity – whether or not to preserve identity properties of a column should be observed.  Value of 1 preserves them. Default is 0</a:t>
-            </a:r>
-          </a:p>
-          <a:p>
-            <a:pPr lvl="2"/>
-            <a:r>
-              <a:rPr lang="en-US" dirty="0"/>
-              <a:t>@</a:t>
+          <a:bodyPr>
+            <a:normAutofit fontScale="92500" lnSpcReduction="10000"/>
+          </a:bodyPr>
+          <a:lstStyle/>
+          <a:p>
+            <a:r>
+              <a:rPr lang="en-US" dirty="0"/>
+              <a:t>Procedure:  EXEC </a:t>
             </a:r>
             <a:r>
               <a:rPr lang="en-US" dirty="0" err="1"/>
-              <a:t>ComputedColumns</a:t>
-            </a:r>
-            <a:r>
-              <a:rPr lang="en-US" dirty="0"/>
-              <a:t> – whether or not to preserve computations. Value of 1 preserves. Default is 0</a:t>
-            </a:r>
-          </a:p>
-          <a:p>
-            <a:pPr lvl="2"/>
-            <a:r>
-              <a:rPr lang="en-US" dirty="0"/>
-              <a:t>@Defaults – if default constraints should be preserved. Value of 1 preserves. Default 0</a:t>
-            </a:r>
-          </a:p>
-          <a:p>
-            <a:pPr lvl="2"/>
-            <a:endParaRPr lang="en-US" dirty="0"/>
+              <a:t>tSQLt.FakeTable</a:t>
+            </a:r>
+            <a:r>
+              <a:rPr lang="en-US" dirty="0"/>
+              <a:t> ‘</a:t>
+            </a:r>
+            <a:r>
+              <a:rPr lang="en-US" dirty="0" err="1"/>
+              <a:t>SchemaName.TableName</a:t>
+            </a:r>
+            <a:r>
+              <a:rPr lang="en-US" dirty="0"/>
+              <a:t>’</a:t>
+            </a:r>
+          </a:p>
+          <a:p>
+            <a:r>
+              <a:rPr lang="en-US" dirty="0"/>
+              <a:t>We can get a “clean slate” version of table</a:t>
+            </a:r>
+          </a:p>
+          <a:p>
+            <a:pPr lvl="1"/>
+            <a:r>
+              <a:rPr lang="en-US" dirty="0"/>
+              <a:t>Same columns*</a:t>
+            </a:r>
+          </a:p>
+          <a:p>
+            <a:pPr lvl="1"/>
+            <a:r>
+              <a:rPr lang="en-US" dirty="0"/>
+              <a:t>No data,  no constraints</a:t>
+            </a:r>
+          </a:p>
+          <a:p>
+            <a:pPr lvl="1"/>
+            <a:endParaRPr lang="en-US" dirty="0"/>
+          </a:p>
+          <a:p>
+            <a:r>
+              <a:rPr lang="en-US" dirty="0"/>
+              <a:t>Will use often – breaks ‘coupling’ in one go</a:t>
+            </a:r>
+          </a:p>
+          <a:p>
+            <a:endParaRPr lang="en-US" dirty="0"/>
+          </a:p>
+          <a:p>
+            <a:r>
+              <a:rPr lang="en-US" b="1" dirty="0"/>
+              <a:t>Make sure to run only via </a:t>
+            </a:r>
+            <a:r>
+              <a:rPr lang="en-US" b="1" dirty="0" err="1"/>
+              <a:t>tSQLt.Run</a:t>
+            </a:r>
+            <a:r>
+              <a:rPr lang="en-US" b="1" dirty="0"/>
+              <a:t>* methods – else not automatically undone!</a:t>
+            </a:r>
           </a:p>
         </p:txBody>
       </p:sp>
     </p:spTree>
     <p:extLst>
       <p:ext uri="{BB962C8B-B14F-4D97-AF65-F5344CB8AC3E}">
-        <p14:creationId xmlns:p14="http://schemas.microsoft.com/office/powerpoint/2010/main" val="1600354876"/>
+        <p14:creationId xmlns:p14="http://schemas.microsoft.com/office/powerpoint/2010/main" val="723964311"/>
       </p:ext>
     </p:extLst>
   </p:cSld>
@@ -4380,7 +4436,7 @@
           <a:p>
             <a:r>
               <a:rPr lang="en-US" dirty="0"/>
-              <a:t>Testing constraints</a:t>
+              <a:t>Faking Tables II</a:t>
             </a:r>
           </a:p>
         </p:txBody>
@@ -4402,55 +4458,48 @@
           <a:p>
             <a:r>
               <a:rPr lang="en-US" dirty="0"/>
-              <a:t>First – fake the table</a:t>
-            </a:r>
-          </a:p>
-          <a:p>
-            <a:endParaRPr lang="en-US" dirty="0"/>
-          </a:p>
-          <a:p>
-            <a:r>
-              <a:rPr lang="en-US" dirty="0"/>
-              <a:t>Then:</a:t>
-            </a:r>
-          </a:p>
-          <a:p>
-            <a:pPr lvl="1"/>
-            <a:r>
-              <a:rPr lang="en-US" dirty="0"/>
-              <a:t>EXEC </a:t>
+              <a:t>To the bit about same columns:</a:t>
+            </a:r>
+          </a:p>
+          <a:p>
+            <a:pPr lvl="2"/>
+            <a:r>
+              <a:rPr lang="en-US" dirty="0"/>
+              <a:t>@Identity – whether or not to preserve identity properties of a column should be observed.  Value of 1 preserves them. Default is 0</a:t>
+            </a:r>
+          </a:p>
+          <a:p>
+            <a:pPr lvl="2"/>
+            <a:r>
+              <a:rPr lang="en-US" dirty="0"/>
+              <a:t>@</a:t>
             </a:r>
             <a:r>
               <a:rPr lang="en-US" dirty="0" err="1"/>
-              <a:t>tSQLt.ApplyConstraint</a:t>
-            </a:r>
-            <a:r>
-              <a:rPr lang="en-US" dirty="0"/>
-              <a:t> ‘</a:t>
-            </a:r>
-            <a:r>
-              <a:rPr lang="en-US" dirty="0" err="1"/>
-              <a:t>schemaName.TestClassName</a:t>
-            </a:r>
-            <a:r>
-              <a:rPr lang="en-US" dirty="0"/>
-              <a:t>’, ‘</a:t>
-            </a:r>
-            <a:r>
-              <a:rPr lang="en-US" dirty="0" err="1"/>
-              <a:t>Constraint_Name</a:t>
-            </a:r>
-            <a:r>
-              <a:rPr lang="en-US" dirty="0"/>
-              <a:t>’</a:t>
-            </a:r>
+              <a:t>ComputedColumns</a:t>
+            </a:r>
+            <a:r>
+              <a:rPr lang="en-US" dirty="0"/>
+              <a:t> – whether or not to preserve computations. Value of 1 preserves. Default is 0</a:t>
+            </a:r>
+          </a:p>
+          <a:p>
+            <a:pPr lvl="2"/>
+            <a:r>
+              <a:rPr lang="en-US" dirty="0"/>
+              <a:t>@Defaults – if default constraints should be preserved. Value of 1 preserves. Default 0</a:t>
+            </a:r>
+          </a:p>
+          <a:p>
+            <a:pPr lvl="2"/>
+            <a:endParaRPr lang="en-US" dirty="0"/>
           </a:p>
         </p:txBody>
       </p:sp>
     </p:spTree>
     <p:extLst>
       <p:ext uri="{BB962C8B-B14F-4D97-AF65-F5344CB8AC3E}">
-        <p14:creationId xmlns:p14="http://schemas.microsoft.com/office/powerpoint/2010/main" val="3221278711"/>
+        <p14:creationId xmlns:p14="http://schemas.microsoft.com/office/powerpoint/2010/main" val="1600354876"/>
       </p:ext>
     </p:extLst>
   </p:cSld>
@@ -4494,7 +4543,7 @@
           <a:p>
             <a:r>
               <a:rPr lang="en-US" dirty="0"/>
-              <a:t>Testing Triggers</a:t>
+              <a:t>Testing constraints</a:t>
             </a:r>
           </a:p>
         </p:txBody>
@@ -4516,23 +4565,27 @@
           <a:p>
             <a:r>
               <a:rPr lang="en-US" dirty="0"/>
-              <a:t>Depending on the trigger, may need to fake multiple tables</a:t>
-            </a:r>
-          </a:p>
-          <a:p>
-            <a:endParaRPr lang="en-US" dirty="0"/>
-          </a:p>
-          <a:p>
-            <a:endParaRPr lang="en-US" dirty="0"/>
-          </a:p>
-          <a:p>
+              <a:t>First – fake the table</a:t>
+            </a:r>
+          </a:p>
+          <a:p>
+            <a:endParaRPr lang="en-US" dirty="0"/>
+          </a:p>
+          <a:p>
+            <a:r>
+              <a:rPr lang="en-US" dirty="0"/>
+              <a:t>Then:</a:t>
+            </a:r>
+          </a:p>
+          <a:p>
+            <a:pPr lvl="1"/>
             <a:r>
               <a:rPr lang="en-US" dirty="0"/>
               <a:t>EXEC </a:t>
             </a:r>
             <a:r>
               <a:rPr lang="en-US" dirty="0" err="1"/>
-              <a:t>tSQLt.ApplyTrigger</a:t>
+              <a:t>tSQLt.ApplyConstraint</a:t>
             </a:r>
             <a:r>
               <a:rPr lang="en-US" dirty="0"/>
@@ -4540,7 +4593,7 @@
             </a:r>
             <a:r>
               <a:rPr lang="en-US" dirty="0" err="1"/>
-              <a:t>schemaName.TableName</a:t>
+              <a:t>schemaName.TestClassName</a:t>
             </a:r>
             <a:r>
               <a:rPr lang="en-US" dirty="0"/>
@@ -4548,11 +4601,11 @@
             </a:r>
             <a:r>
               <a:rPr lang="en-US" dirty="0" err="1"/>
-              <a:t>triggerName</a:t>
-            </a:r>
-            <a:r>
-              <a:rPr lang="en-US" dirty="0"/>
-              <a:t>’ </a:t>
+              <a:t>Constraint_Name</a:t>
+            </a:r>
+            <a:r>
+              <a:rPr lang="en-US" dirty="0"/>
+              <a:t>’</a:t>
             </a:r>
           </a:p>
         </p:txBody>
@@ -4560,7 +4613,7 @@
     </p:spTree>
     <p:extLst>
       <p:ext uri="{BB962C8B-B14F-4D97-AF65-F5344CB8AC3E}">
-        <p14:creationId xmlns:p14="http://schemas.microsoft.com/office/powerpoint/2010/main" val="893636569"/>
+        <p14:creationId xmlns:p14="http://schemas.microsoft.com/office/powerpoint/2010/main" val="3221278711"/>
       </p:ext>
     </p:extLst>
   </p:cSld>
@@ -4604,7 +4657,7 @@
           <a:p>
             <a:r>
               <a:rPr lang="en-US" dirty="0"/>
-              <a:t>Resources &amp; Reading</a:t>
+              <a:t>Testing Triggers</a:t>
             </a:r>
           </a:p>
         </p:txBody>
@@ -4626,93 +4679,43 @@
           <a:p>
             <a:r>
               <a:rPr lang="en-US" dirty="0"/>
-              <a:t>Project webpage: </a:t>
-            </a:r>
-            <a:r>
-              <a:rPr lang="en-US" dirty="0">
-                <a:hlinkClick r:id="rId2"/>
-              </a:rPr>
-              <a:t>http://tsqlt.org/</a:t>
-            </a:r>
-            <a:r>
-              <a:rPr lang="en-US" dirty="0"/>
-              <a:t> </a:t>
-            </a:r>
-          </a:p>
-          <a:p>
-            <a:r>
-              <a:rPr lang="en-US" dirty="0"/>
-              <a:t>Talk by Sebastian </a:t>
+              <a:t>Depending on the trigger, may need to fake multiple tables</a:t>
+            </a:r>
+          </a:p>
+          <a:p>
+            <a:endParaRPr lang="en-US" dirty="0"/>
+          </a:p>
+          <a:p>
+            <a:endParaRPr lang="en-US" dirty="0"/>
+          </a:p>
+          <a:p>
+            <a:r>
+              <a:rPr lang="en-US" dirty="0"/>
+              <a:t>EXEC </a:t>
             </a:r>
             <a:r>
               <a:rPr lang="en-US" dirty="0" err="1"/>
-              <a:t>Meine</a:t>
-            </a:r>
-            <a:r>
-              <a:rPr lang="en-US" dirty="0"/>
-              <a:t> (Co-author) and Steve Jones</a:t>
-            </a:r>
-          </a:p>
-          <a:p>
-            <a:pPr lvl="1"/>
-            <a:r>
-              <a:rPr lang="en-US" dirty="0">
-                <a:hlinkClick r:id="rId3"/>
-              </a:rPr>
-              <a:t>https://www.red-gate.com/library/unit-testing-in-sql-server-with-tsqlt</a:t>
-            </a:r>
-            <a:r>
-              <a:rPr lang="en-US" dirty="0"/>
-              <a:t> </a:t>
-            </a:r>
-          </a:p>
-          <a:p>
-            <a:r>
-              <a:rPr lang="en-US" dirty="0"/>
-              <a:t>Refactoring Databases: Evolutionary Database Design</a:t>
-            </a:r>
-          </a:p>
-          <a:p>
-            <a:pPr lvl="1"/>
-            <a:r>
-              <a:rPr lang="en-US" dirty="0"/>
-              <a:t>By Scott J. Ambler and </a:t>
+              <a:t>tSQLt.ApplyTrigger</a:t>
+            </a:r>
+            <a:r>
+              <a:rPr lang="en-US" dirty="0"/>
+              <a:t> ‘</a:t>
             </a:r>
             <a:r>
               <a:rPr lang="en-US" dirty="0" err="1"/>
-              <a:t>Pramod</a:t>
-            </a:r>
-            <a:r>
-              <a:rPr lang="en-US" dirty="0"/>
-              <a:t> J. </a:t>
+              <a:t>schemaName.TableName</a:t>
+            </a:r>
+            <a:r>
+              <a:rPr lang="en-US" dirty="0"/>
+              <a:t>’, ‘</a:t>
             </a:r>
             <a:r>
               <a:rPr lang="en-US" dirty="0" err="1"/>
-              <a:t>Sadalage</a:t>
-            </a:r>
-            <a:endParaRPr lang="en-US" dirty="0"/>
-          </a:p>
-          <a:p>
-            <a:pPr lvl="1"/>
-            <a:r>
-              <a:rPr lang="en-US" dirty="0"/>
-              <a:t>Companion site: </a:t>
-            </a:r>
-            <a:r>
-              <a:rPr lang="en-US" dirty="0">
-                <a:hlinkClick r:id="rId4"/>
-              </a:rPr>
-              <a:t>http://databaserefactoring.com/</a:t>
-            </a:r>
-            <a:r>
-              <a:rPr lang="en-US" dirty="0"/>
-              <a:t> </a:t>
-            </a:r>
-          </a:p>
-          <a:p>
-            <a:r>
-              <a:rPr lang="en-US" dirty="0"/>
-              <a:t>Simple Talk articles on DLM &amp; DB testing</a:t>
+              <a:t>triggerName</a:t>
+            </a:r>
+            <a:r>
+              <a:rPr lang="en-US" dirty="0"/>
+              <a:t>’ </a:t>
             </a:r>
           </a:p>
         </p:txBody>
@@ -4720,7 +4723,7 @@
     </p:spTree>
     <p:extLst>
       <p:ext uri="{BB962C8B-B14F-4D97-AF65-F5344CB8AC3E}">
-        <p14:creationId xmlns:p14="http://schemas.microsoft.com/office/powerpoint/2010/main" val="2129555590"/>
+        <p14:creationId xmlns:p14="http://schemas.microsoft.com/office/powerpoint/2010/main" val="893636569"/>
       </p:ext>
     </p:extLst>
   </p:cSld>
@@ -4754,6 +4757,486 @@
             <a:spLocks noGrp="1"/>
           </p:cNvSpPr>
           <p:nvPr>
+            <p:ph type="title"/>
+          </p:nvPr>
+        </p:nvSpPr>
+        <p:spPr/>
+        <p:txBody>
+          <a:bodyPr/>
+          <a:lstStyle/>
+          <a:p>
+            <a:r>
+              <a:rPr lang="en-US" dirty="0"/>
+              <a:t>Spy Procedure</a:t>
+            </a:r>
+          </a:p>
+        </p:txBody>
+      </p:sp>
+      <p:sp>
+        <p:nvSpPr>
+          <p:cNvPr id="3" name="Content Placeholder 2"/>
+          <p:cNvSpPr>
+            <a:spLocks noGrp="1"/>
+          </p:cNvSpPr>
+          <p:nvPr>
+            <p:ph idx="1"/>
+          </p:nvPr>
+        </p:nvSpPr>
+        <p:spPr/>
+        <p:txBody>
+          <a:bodyPr/>
+          <a:lstStyle/>
+          <a:p>
+            <a:r>
+              <a:rPr lang="en-US" dirty="0"/>
+              <a:t>Key features</a:t>
+            </a:r>
+          </a:p>
+          <a:p>
+            <a:pPr lvl="1"/>
+            <a:r>
+              <a:rPr lang="en-US" dirty="0"/>
+              <a:t>Isolate procedures depended on. Can also specify the command executed</a:t>
+            </a:r>
+          </a:p>
+          <a:p>
+            <a:pPr lvl="1"/>
+            <a:r>
+              <a:rPr lang="en-US" dirty="0"/>
+              <a:t>Record parameters</a:t>
+            </a:r>
+          </a:p>
+          <a:p>
+            <a:pPr lvl="1"/>
+            <a:endParaRPr lang="en-US" dirty="0"/>
+          </a:p>
+          <a:p>
+            <a:r>
+              <a:rPr lang="en-US" dirty="0"/>
+              <a:t>Limitations</a:t>
+            </a:r>
+          </a:p>
+          <a:p>
+            <a:pPr lvl="1"/>
+            <a:r>
+              <a:rPr lang="en-US" dirty="0"/>
+              <a:t>Procedures max 1020 cols</a:t>
+            </a:r>
+          </a:p>
+          <a:p>
+            <a:pPr lvl="1"/>
+            <a:r>
+              <a:rPr lang="en-US" dirty="0"/>
+              <a:t>Doesn’t work with temp stored procedures</a:t>
+            </a:r>
+          </a:p>
+        </p:txBody>
+      </p:sp>
+    </p:spTree>
+    <p:extLst>
+      <p:ext uri="{BB962C8B-B14F-4D97-AF65-F5344CB8AC3E}">
+        <p14:creationId xmlns:p14="http://schemas.microsoft.com/office/powerpoint/2010/main" val="1251098165"/>
+      </p:ext>
+    </p:extLst>
+  </p:cSld>
+  <p:clrMapOvr>
+    <a:masterClrMapping/>
+  </p:clrMapOvr>
+</p:sld>
+</file>
+
+<file path=ppt/slides/slide16.xml><?xml version="1.0" encoding="utf-8"?>
+<p:sld xmlns:a="http://schemas.openxmlformats.org/drawingml/2006/main" xmlns:r="http://schemas.openxmlformats.org/officeDocument/2006/relationships" xmlns:p="http://schemas.openxmlformats.org/presentationml/2006/main">
+  <p:cSld>
+    <p:spTree>
+      <p:nvGrpSpPr>
+        <p:cNvPr id="1" name=""/>
+        <p:cNvGrpSpPr/>
+        <p:nvPr/>
+      </p:nvGrpSpPr>
+      <p:grpSpPr>
+        <a:xfrm>
+          <a:off x="0" y="0"/>
+          <a:ext cx="0" cy="0"/>
+          <a:chOff x="0" y="0"/>
+          <a:chExt cx="0" cy="0"/>
+        </a:xfrm>
+      </p:grpSpPr>
+      <p:sp>
+        <p:nvSpPr>
+          <p:cNvPr id="2" name="Title 1"/>
+          <p:cNvSpPr>
+            <a:spLocks noGrp="1"/>
+          </p:cNvSpPr>
+          <p:nvPr>
+            <p:ph type="title"/>
+          </p:nvPr>
+        </p:nvSpPr>
+        <p:spPr/>
+        <p:txBody>
+          <a:bodyPr/>
+          <a:lstStyle/>
+          <a:p>
+            <a:r>
+              <a:rPr lang="en-US" dirty="0"/>
+              <a:t>Other Isolation procs</a:t>
+            </a:r>
+          </a:p>
+        </p:txBody>
+      </p:sp>
+      <p:sp>
+        <p:nvSpPr>
+          <p:cNvPr id="3" name="Content Placeholder 2"/>
+          <p:cNvSpPr>
+            <a:spLocks noGrp="1"/>
+          </p:cNvSpPr>
+          <p:nvPr>
+            <p:ph idx="1"/>
+          </p:nvPr>
+        </p:nvSpPr>
+        <p:spPr/>
+        <p:txBody>
+          <a:bodyPr/>
+          <a:lstStyle/>
+          <a:p>
+            <a:r>
+              <a:rPr lang="en-US" dirty="0" err="1"/>
+              <a:t>FakeFunction</a:t>
+            </a:r>
+            <a:endParaRPr lang="en-US" dirty="0"/>
+          </a:p>
+          <a:p>
+            <a:pPr lvl="1"/>
+            <a:r>
+              <a:rPr lang="en-US" dirty="0"/>
+              <a:t>Replace an existing function with a function you specify (by name in </a:t>
+            </a:r>
+            <a:r>
+              <a:rPr lang="en-US" dirty="0" err="1"/>
+              <a:t>params</a:t>
+            </a:r>
+            <a:r>
+              <a:rPr lang="en-US" dirty="0"/>
+              <a:t>)</a:t>
+            </a:r>
+          </a:p>
+          <a:p>
+            <a:pPr lvl="1"/>
+            <a:endParaRPr lang="en-US" dirty="0"/>
+          </a:p>
+          <a:p>
+            <a:r>
+              <a:rPr lang="en-US" dirty="0" err="1"/>
+              <a:t>RemoveObject</a:t>
+            </a:r>
+            <a:endParaRPr lang="en-US" dirty="0"/>
+          </a:p>
+          <a:p>
+            <a:pPr lvl="1"/>
+            <a:r>
+              <a:rPr lang="en-US" dirty="0"/>
+              <a:t>Remove reference to an object, so you can define your own,</a:t>
+            </a:r>
+          </a:p>
+          <a:p>
+            <a:pPr lvl="1"/>
+            <a:r>
+              <a:rPr lang="en-US" dirty="0"/>
+              <a:t>@</a:t>
+            </a:r>
+            <a:r>
+              <a:rPr lang="en-US" dirty="0" err="1"/>
+              <a:t>IfExists</a:t>
+            </a:r>
+            <a:r>
+              <a:rPr lang="en-US" dirty="0"/>
+              <a:t> - Can raise error if object does not exist (=0), or </a:t>
+            </a:r>
+            <a:r>
+              <a:rPr lang="en-US" dirty="0" err="1"/>
+              <a:t>NoOp</a:t>
+            </a:r>
+            <a:r>
+              <a:rPr lang="en-US" dirty="0"/>
+              <a:t> (=1)</a:t>
+            </a:r>
+          </a:p>
+          <a:p>
+            <a:endParaRPr lang="en-US" dirty="0"/>
+          </a:p>
+          <a:p>
+            <a:r>
+              <a:rPr lang="en-US" dirty="0" err="1"/>
+              <a:t>RemoveObjectIfExists</a:t>
+            </a:r>
+            <a:r>
+              <a:rPr lang="en-US" dirty="0"/>
+              <a:t> – </a:t>
+            </a:r>
+            <a:r>
+              <a:rPr lang="en-US" dirty="0" err="1"/>
+              <a:t>RemoveObject</a:t>
+            </a:r>
+            <a:r>
+              <a:rPr lang="en-US" dirty="0"/>
+              <a:t> with @</a:t>
+            </a:r>
+            <a:r>
+              <a:rPr lang="en-US" dirty="0" err="1"/>
+              <a:t>IfExists</a:t>
+            </a:r>
+            <a:r>
+              <a:rPr lang="en-US" dirty="0"/>
+              <a:t> = 1</a:t>
+            </a:r>
+          </a:p>
+          <a:p>
+            <a:pPr lvl="1"/>
+            <a:endParaRPr lang="en-US" dirty="0"/>
+          </a:p>
+          <a:p>
+            <a:pPr lvl="1"/>
+            <a:endParaRPr lang="en-US" dirty="0"/>
+          </a:p>
+          <a:p>
+            <a:pPr lvl="1"/>
+            <a:endParaRPr lang="en-US" dirty="0"/>
+          </a:p>
+          <a:p>
+            <a:endParaRPr lang="en-US" dirty="0"/>
+          </a:p>
+        </p:txBody>
+      </p:sp>
+    </p:spTree>
+    <p:extLst>
+      <p:ext uri="{BB962C8B-B14F-4D97-AF65-F5344CB8AC3E}">
+        <p14:creationId xmlns:p14="http://schemas.microsoft.com/office/powerpoint/2010/main" val="3606199535"/>
+      </p:ext>
+    </p:extLst>
+  </p:cSld>
+  <p:clrMapOvr>
+    <a:masterClrMapping/>
+  </p:clrMapOvr>
+</p:sld>
+</file>
+
+<file path=ppt/slides/slide17.xml><?xml version="1.0" encoding="utf-8"?>
+<p:sld xmlns:a="http://schemas.openxmlformats.org/drawingml/2006/main" xmlns:r="http://schemas.openxmlformats.org/officeDocument/2006/relationships" xmlns:p="http://schemas.openxmlformats.org/presentationml/2006/main">
+  <p:cSld>
+    <p:spTree>
+      <p:nvGrpSpPr>
+        <p:cNvPr id="1" name=""/>
+        <p:cNvGrpSpPr/>
+        <p:nvPr/>
+      </p:nvGrpSpPr>
+      <p:grpSpPr>
+        <a:xfrm>
+          <a:off x="0" y="0"/>
+          <a:ext cx="0" cy="0"/>
+          <a:chOff x="0" y="0"/>
+          <a:chExt cx="0" cy="0"/>
+        </a:xfrm>
+      </p:grpSpPr>
+      <p:sp>
+        <p:nvSpPr>
+          <p:cNvPr id="2" name="Title 1"/>
+          <p:cNvSpPr>
+            <a:spLocks noGrp="1"/>
+          </p:cNvSpPr>
+          <p:nvPr>
+            <p:ph type="title"/>
+          </p:nvPr>
+        </p:nvSpPr>
+        <p:spPr/>
+        <p:txBody>
+          <a:bodyPr/>
+          <a:lstStyle/>
+          <a:p>
+            <a:r>
+              <a:rPr lang="en-US" dirty="0"/>
+              <a:t>Resources &amp; Reading</a:t>
+            </a:r>
+          </a:p>
+        </p:txBody>
+      </p:sp>
+      <p:sp>
+        <p:nvSpPr>
+          <p:cNvPr id="3" name="Content Placeholder 2"/>
+          <p:cNvSpPr>
+            <a:spLocks noGrp="1"/>
+          </p:cNvSpPr>
+          <p:nvPr>
+            <p:ph idx="1"/>
+          </p:nvPr>
+        </p:nvSpPr>
+        <p:spPr/>
+        <p:txBody>
+          <a:bodyPr>
+            <a:normAutofit fontScale="85000" lnSpcReduction="10000"/>
+          </a:bodyPr>
+          <a:lstStyle/>
+          <a:p>
+            <a:r>
+              <a:rPr lang="en-US" dirty="0"/>
+              <a:t>Project webpage: </a:t>
+            </a:r>
+            <a:r>
+              <a:rPr lang="en-US" dirty="0">
+                <a:hlinkClick r:id="rId2"/>
+              </a:rPr>
+              <a:t>http://tsqlt.org/</a:t>
+            </a:r>
+            <a:r>
+              <a:rPr lang="en-US" dirty="0"/>
+              <a:t> </a:t>
+            </a:r>
+          </a:p>
+          <a:p>
+            <a:r>
+              <a:rPr lang="en-US" dirty="0"/>
+              <a:t>Simple Talk articles on DLM &amp; DB testing</a:t>
+            </a:r>
+          </a:p>
+          <a:p>
+            <a:pPr lvl="1"/>
+            <a:r>
+              <a:rPr lang="en-US" dirty="0"/>
+              <a:t>Getting started testing databases with </a:t>
+            </a:r>
+            <a:r>
+              <a:rPr lang="en-US" dirty="0" err="1"/>
+              <a:t>tSQLt</a:t>
+            </a:r>
+            <a:r>
+              <a:rPr lang="en-US" dirty="0"/>
+              <a:t>: </a:t>
+            </a:r>
+            <a:r>
+              <a:rPr lang="en-US" dirty="0">
+                <a:hlinkClick r:id="rId3"/>
+              </a:rPr>
+              <a:t>https://www.simple-talk.com/sql/t-sql-programming/getting-started-testing-databases-with-tsqlt/</a:t>
+            </a:r>
+            <a:r>
+              <a:rPr lang="en-US" dirty="0"/>
+              <a:t> </a:t>
+            </a:r>
+          </a:p>
+          <a:p>
+            <a:pPr lvl="1"/>
+            <a:r>
+              <a:rPr lang="en-US" dirty="0"/>
+              <a:t>DLM Practices &amp; Patterns Library: </a:t>
+            </a:r>
+            <a:r>
+              <a:rPr lang="en-US" dirty="0">
+                <a:hlinkClick r:id="rId4"/>
+              </a:rPr>
+              <a:t>https://www.simple-talk.com/collections/database-lifecycle-management-patterns-practices-library/</a:t>
+            </a:r>
+            <a:r>
+              <a:rPr lang="en-US" dirty="0"/>
+              <a:t> </a:t>
+            </a:r>
+          </a:p>
+          <a:p>
+            <a:r>
+              <a:rPr lang="en-US" dirty="0"/>
+              <a:t>Refactoring Databases: Evolutionary Database Design,</a:t>
+            </a:r>
+          </a:p>
+          <a:p>
+            <a:pPr lvl="1"/>
+            <a:r>
+              <a:rPr lang="en-US" dirty="0"/>
+              <a:t>By Scott J. Ambler and </a:t>
+            </a:r>
+            <a:r>
+              <a:rPr lang="en-US" dirty="0" err="1"/>
+              <a:t>Pramod</a:t>
+            </a:r>
+            <a:r>
+              <a:rPr lang="en-US" dirty="0"/>
+              <a:t> J. </a:t>
+            </a:r>
+            <a:r>
+              <a:rPr lang="en-US" dirty="0" err="1"/>
+              <a:t>Sadalage</a:t>
+            </a:r>
+            <a:endParaRPr lang="en-US" dirty="0"/>
+          </a:p>
+          <a:p>
+            <a:pPr lvl="1"/>
+            <a:r>
+              <a:rPr lang="en-US" dirty="0"/>
+              <a:t>Companion site: </a:t>
+            </a:r>
+            <a:r>
+              <a:rPr lang="en-US" dirty="0">
+                <a:hlinkClick r:id="rId5"/>
+              </a:rPr>
+              <a:t>http://databaserefactoring.com/</a:t>
+            </a:r>
+            <a:r>
+              <a:rPr lang="en-US" dirty="0"/>
+              <a:t> </a:t>
+            </a:r>
+          </a:p>
+          <a:p>
+            <a:r>
+              <a:rPr lang="en-US" dirty="0"/>
+              <a:t>Integrate with CI (Cruise Control):  </a:t>
+            </a:r>
+            <a:r>
+              <a:rPr lang="en-US" dirty="0">
+                <a:hlinkClick r:id="rId6"/>
+              </a:rPr>
+              <a:t>http://tsqlt.org/177/integrating-tsqlt-with-cruise-control/</a:t>
+            </a:r>
+            <a:r>
+              <a:rPr lang="en-US" dirty="0"/>
+              <a:t> </a:t>
+            </a:r>
+          </a:p>
+        </p:txBody>
+      </p:sp>
+    </p:spTree>
+    <p:extLst>
+      <p:ext uri="{BB962C8B-B14F-4D97-AF65-F5344CB8AC3E}">
+        <p14:creationId xmlns:p14="http://schemas.microsoft.com/office/powerpoint/2010/main" val="2129555590"/>
+      </p:ext>
+    </p:extLst>
+  </p:cSld>
+  <p:clrMapOvr>
+    <a:masterClrMapping/>
+  </p:clrMapOvr>
+</p:sld>
+</file>
+
+<file path=ppt/slides/slide18.xml><?xml version="1.0" encoding="utf-8"?>
+<p:sld xmlns:a="http://schemas.openxmlformats.org/drawingml/2006/main" xmlns:r="http://schemas.openxmlformats.org/officeDocument/2006/relationships" xmlns:p="http://schemas.openxmlformats.org/presentationml/2006/main">
+  <p:cSld>
+    <p:spTree>
+      <p:nvGrpSpPr>
+        <p:cNvPr id="1" name=""/>
+        <p:cNvGrpSpPr/>
+        <p:nvPr/>
+      </p:nvGrpSpPr>
+      <p:grpSpPr>
+        <a:xfrm>
+          <a:off x="0" y="0"/>
+          <a:ext cx="0" cy="0"/>
+          <a:chOff x="0" y="0"/>
+          <a:chExt cx="0" cy="0"/>
+        </a:xfrm>
+      </p:grpSpPr>
+      <p:sp>
+        <p:nvSpPr>
+          <p:cNvPr id="2" name="Title 1"/>
+          <p:cNvSpPr>
+            <a:spLocks noGrp="1"/>
+          </p:cNvSpPr>
+          <p:nvPr>
             <p:ph type="ctrTitle"/>
           </p:nvPr>
         </p:nvSpPr>
@@ -4801,7 +5284,7 @@
 </p:sld>
 </file>
 
-<file path=ppt/slides/slide16.xml><?xml version="1.0" encoding="utf-8"?>
+<file path=ppt/slides/slide19.xml><?xml version="1.0" encoding="utf-8"?>
 <p:sld xmlns:a="http://schemas.openxmlformats.org/drawingml/2006/main" xmlns:r="http://schemas.openxmlformats.org/officeDocument/2006/relationships" xmlns:p="http://schemas.openxmlformats.org/presentationml/2006/main">
   <p:cSld>
     <p:spTree>
@@ -5007,7 +5490,15 @@
           <a:p>
             <a:r>
               <a:rPr lang="en-US" dirty="0"/>
-              <a:t>Motivation</a:t>
+              <a:t>What is </a:t>
+            </a:r>
+            <a:r>
+              <a:rPr lang="en-US" dirty="0" err="1"/>
+              <a:t>tSQLt</a:t>
+            </a:r>
+            <a:r>
+              <a:rPr lang="en-US" dirty="0"/>
+              <a:t>?</a:t>
             </a:r>
           </a:p>
         </p:txBody>
@@ -5024,52 +5515,66 @@
         </p:nvSpPr>
         <p:spPr/>
         <p:txBody>
-          <a:bodyPr/>
-          <a:lstStyle/>
-          <a:p>
-            <a:r>
-              <a:rPr lang="en-US" dirty="0"/>
-              <a:t>We like tests</a:t>
-            </a:r>
-          </a:p>
-          <a:p>
-            <a:r>
-              <a:rPr lang="en-US" dirty="0"/>
-              <a:t>Traditional approaches: Coupling of code abstractions with DB</a:t>
-            </a:r>
-          </a:p>
-          <a:p>
-            <a:r>
-              <a:rPr lang="en-US" dirty="0"/>
-              <a:t>‘Native’ language: Same logic as any procs, </a:t>
-            </a:r>
-            <a:r>
-              <a:rPr lang="en-US" dirty="0" err="1"/>
-              <a:t>funcs</a:t>
-            </a:r>
-            <a:r>
-              <a:rPr lang="en-US" dirty="0"/>
-              <a:t>, tables</a:t>
-            </a:r>
-          </a:p>
-          <a:p>
-            <a:r>
-              <a:rPr lang="en-US" dirty="0"/>
-              <a:t>Data people may not be code people</a:t>
-            </a:r>
-          </a:p>
-          <a:p>
-            <a:r>
-              <a:rPr lang="en-US" b="1" dirty="0"/>
-              <a:t>Data can </a:t>
-            </a:r>
-            <a:r>
-              <a:rPr lang="en-US" b="1" u="sng" dirty="0"/>
-              <a:t>be</a:t>
-            </a:r>
-            <a:r>
-              <a:rPr lang="en-US" b="1" dirty="0"/>
-              <a:t> the business</a:t>
+          <a:bodyPr>
+            <a:normAutofit/>
+          </a:bodyPr>
+          <a:lstStyle/>
+          <a:p>
+            <a:r>
+              <a:rPr lang="en-US" dirty="0"/>
+              <a:t>Unit testing framework for SQL Server</a:t>
+            </a:r>
+          </a:p>
+          <a:p>
+            <a:pPr lvl="1"/>
+            <a:r>
+              <a:rPr lang="en-US" dirty="0"/>
+              <a:t>Compatible with 2005+</a:t>
+            </a:r>
+          </a:p>
+          <a:p>
+            <a:endParaRPr lang="en-US" dirty="0"/>
+          </a:p>
+          <a:p>
+            <a:r>
+              <a:rPr lang="en-US" dirty="0"/>
+              <a:t>Open source</a:t>
+            </a:r>
+          </a:p>
+          <a:p>
+            <a:pPr lvl="1"/>
+            <a:r>
+              <a:rPr lang="en-US" dirty="0"/>
+              <a:t>Apache 2.0</a:t>
+            </a:r>
+          </a:p>
+          <a:p>
+            <a:pPr lvl="1"/>
+            <a:r>
+              <a:rPr lang="en-US" dirty="0"/>
+              <a:t>Hosted on GitHub ( </a:t>
+            </a:r>
+            <a:r>
+              <a:rPr lang="en-US" dirty="0">
+                <a:hlinkClick r:id="rId2"/>
+              </a:rPr>
+              <a:t>https://github.com/tSQLt-org/tSQLt</a:t>
+            </a:r>
+            <a:r>
+              <a:rPr lang="en-US" dirty="0"/>
+              <a:t> )</a:t>
+            </a:r>
+          </a:p>
+          <a:p>
+            <a:pPr marL="0" indent="0">
+              <a:buNone/>
+            </a:pPr>
+            <a:endParaRPr lang="en-US" dirty="0"/>
+          </a:p>
+          <a:p>
+            <a:r>
+              <a:rPr lang="en-US" dirty="0"/>
+              <a:t>Allows us to write unit tests for SQL Server entirely in T-SQL</a:t>
             </a:r>
           </a:p>
         </p:txBody>
@@ -5077,7 +5582,7 @@
     </p:spTree>
     <p:extLst>
       <p:ext uri="{BB962C8B-B14F-4D97-AF65-F5344CB8AC3E}">
-        <p14:creationId xmlns:p14="http://schemas.microsoft.com/office/powerpoint/2010/main" val="896298079"/>
+        <p14:creationId xmlns:p14="http://schemas.microsoft.com/office/powerpoint/2010/main" val="996595385"/>
       </p:ext>
     </p:extLst>
   </p:cSld>
@@ -5121,7 +5626,7 @@
           <a:p>
             <a:r>
               <a:rPr lang="en-US" dirty="0"/>
-              <a:t>What might we test?</a:t>
+              <a:t>Motivation</a:t>
             </a:r>
           </a:p>
         </p:txBody>
@@ -5142,80 +5647,59 @@
           <a:lstStyle/>
           <a:p>
             <a:r>
-              <a:rPr lang="en-US" dirty="0"/>
-              <a:t>Data?</a:t>
-            </a:r>
-          </a:p>
-          <a:p>
-            <a:pPr lvl="1"/>
-            <a:r>
-              <a:rPr lang="en-US" dirty="0"/>
-              <a:t>This presentation: Prefer ensuring only good data makes it in</a:t>
-            </a:r>
-          </a:p>
-          <a:p>
-            <a:pPr lvl="1"/>
-            <a:r>
-              <a:rPr lang="en-US" dirty="0"/>
-              <a:t>Data quality important,  enough for own topic. (Slightly more integration)</a:t>
-            </a:r>
-          </a:p>
-          <a:p>
-            <a:pPr lvl="1"/>
-            <a:r>
-              <a:rPr lang="en-US" dirty="0"/>
-              <a:t>By all means, </a:t>
+              <a:rPr lang="en-US" b="1" dirty="0"/>
+              <a:t>Data can </a:t>
+            </a:r>
+            <a:r>
+              <a:rPr lang="en-US" b="1" u="sng" dirty="0"/>
+              <a:t>be</a:t>
+            </a:r>
+            <a:r>
+              <a:rPr lang="en-US" b="1" dirty="0"/>
+              <a:t> the business</a:t>
+            </a:r>
+          </a:p>
+          <a:p>
+            <a:pPr marL="0" indent="0">
+              <a:buNone/>
+            </a:pPr>
+            <a:r>
+              <a:rPr lang="en-US" dirty="0"/>
+              <a:t>------------------------------------------</a:t>
+            </a:r>
+          </a:p>
+          <a:p>
+            <a:r>
+              <a:rPr lang="en-US" dirty="0"/>
+              <a:t>Traditional approaches: Coupling of code abstractions with DB</a:t>
+            </a:r>
+          </a:p>
+          <a:p>
+            <a:r>
+              <a:rPr lang="en-US" dirty="0"/>
+              <a:t>‘Native’ language: Same logic as any procs, </a:t>
             </a:r>
             <a:r>
               <a:rPr lang="en-US" dirty="0" err="1"/>
-              <a:t>tSQLt</a:t>
-            </a:r>
-            <a:r>
-              <a:rPr lang="en-US" dirty="0"/>
-              <a:t> may be of use to you (standard test functions)</a:t>
-            </a:r>
-          </a:p>
-          <a:p>
-            <a:r>
-              <a:rPr lang="en-US" dirty="0"/>
-              <a:t>Database objects</a:t>
-            </a:r>
-          </a:p>
-          <a:p>
-            <a:pPr lvl="1"/>
-            <a:r>
-              <a:rPr lang="en-US" dirty="0"/>
-              <a:t>Analogous to testing our code – ensuring specified behavior</a:t>
-            </a:r>
-          </a:p>
-          <a:p>
-            <a:pPr lvl="1"/>
-            <a:r>
-              <a:rPr lang="en-US" dirty="0"/>
-              <a:t>Baked-in coupling: referential integrity is the bane of unit testing</a:t>
-            </a:r>
-          </a:p>
-          <a:p>
-            <a:pPr lvl="2"/>
-            <a:r>
-              <a:rPr lang="en-US" dirty="0" err="1"/>
-              <a:t>tSQLt</a:t>
-            </a:r>
-            <a:r>
-              <a:rPr lang="en-US" dirty="0"/>
-              <a:t> has answers for this</a:t>
-            </a:r>
-          </a:p>
-          <a:p>
-            <a:pPr lvl="1"/>
-            <a:endParaRPr lang="en-US" dirty="0"/>
+              <a:t>funcs</a:t>
+            </a:r>
+            <a:r>
+              <a:rPr lang="en-US" dirty="0"/>
+              <a:t>, tables</a:t>
+            </a:r>
+          </a:p>
+          <a:p>
+            <a:r>
+              <a:rPr lang="en-US" dirty="0"/>
+              <a:t>Data people may not be code people</a:t>
+            </a:r>
           </a:p>
         </p:txBody>
       </p:sp>
     </p:spTree>
     <p:extLst>
       <p:ext uri="{BB962C8B-B14F-4D97-AF65-F5344CB8AC3E}">
-        <p14:creationId xmlns:p14="http://schemas.microsoft.com/office/powerpoint/2010/main" val="118135021"/>
+        <p14:creationId xmlns:p14="http://schemas.microsoft.com/office/powerpoint/2010/main" val="896298079"/>
       </p:ext>
     </p:extLst>
   </p:cSld>
@@ -5259,37 +5743,101 @@
           <a:p>
             <a:r>
               <a:rPr lang="en-US" dirty="0"/>
-              <a:t>Examples</a:t>
-            </a:r>
-          </a:p>
-        </p:txBody>
-      </p:sp>
-      <p:sp>
-        <p:nvSpPr>
-          <p:cNvPr id="3" name="Text Placeholder 2"/>
-          <p:cNvSpPr>
-            <a:spLocks noGrp="1"/>
-          </p:cNvSpPr>
-          <p:nvPr>
-            <p:ph type="body" idx="1"/>
-          </p:nvPr>
-        </p:nvSpPr>
-        <p:spPr/>
-        <p:txBody>
-          <a:bodyPr/>
-          <a:lstStyle/>
-          <a:p>
-            <a:r>
-              <a:rPr lang="en-US" dirty="0"/>
-              <a:t>Note: Some examples use AdventureWorks2014</a:t>
-            </a:r>
+              <a:t>What might we test?</a:t>
+            </a:r>
+          </a:p>
+        </p:txBody>
+      </p:sp>
+      <p:sp>
+        <p:nvSpPr>
+          <p:cNvPr id="3" name="Content Placeholder 2"/>
+          <p:cNvSpPr>
+            <a:spLocks noGrp="1"/>
+          </p:cNvSpPr>
+          <p:nvPr>
+            <p:ph idx="1"/>
+          </p:nvPr>
+        </p:nvSpPr>
+        <p:spPr/>
+        <p:txBody>
+          <a:bodyPr/>
+          <a:lstStyle/>
+          <a:p>
+            <a:r>
+              <a:rPr lang="en-US" dirty="0"/>
+              <a:t>Data?</a:t>
+            </a:r>
+          </a:p>
+          <a:p>
+            <a:pPr lvl="1"/>
+            <a:r>
+              <a:rPr lang="en-US" dirty="0"/>
+              <a:t>This presentation: Prefer ensuring only good data makes it in</a:t>
+            </a:r>
+          </a:p>
+          <a:p>
+            <a:pPr lvl="1"/>
+            <a:r>
+              <a:rPr lang="en-US" dirty="0"/>
+              <a:t>Data quality important,  enough for own topic. (Slightly more integration)</a:t>
+            </a:r>
+          </a:p>
+          <a:p>
+            <a:pPr lvl="1"/>
+            <a:r>
+              <a:rPr lang="en-US" dirty="0"/>
+              <a:t>By all means, </a:t>
+            </a:r>
+            <a:r>
+              <a:rPr lang="en-US" dirty="0" err="1"/>
+              <a:t>tSQLt</a:t>
+            </a:r>
+            <a:r>
+              <a:rPr lang="en-US" dirty="0"/>
+              <a:t> may be of use to you (standard test functions)</a:t>
+            </a:r>
+          </a:p>
+          <a:p>
+            <a:r>
+              <a:rPr lang="en-US" dirty="0"/>
+              <a:t>Database objects</a:t>
+            </a:r>
+          </a:p>
+          <a:p>
+            <a:pPr lvl="1"/>
+            <a:r>
+              <a:rPr lang="en-US" dirty="0"/>
+              <a:t>Analogous to testing our code – ensuring specified behavior</a:t>
+            </a:r>
+          </a:p>
+          <a:p>
+            <a:pPr lvl="1"/>
+            <a:r>
+              <a:rPr lang="en-US" dirty="0"/>
+              <a:t>Baked-in coupling: referential integrity is the bane of unit testing</a:t>
+            </a:r>
+          </a:p>
+          <a:p>
+            <a:pPr lvl="2"/>
+            <a:r>
+              <a:rPr lang="en-US" dirty="0" err="1"/>
+              <a:t>tSQLt</a:t>
+            </a:r>
+            <a:r>
+              <a:rPr lang="en-US" dirty="0"/>
+              <a:t> has answers for this</a:t>
+            </a:r>
+          </a:p>
+          <a:p>
+            <a:pPr lvl="1"/>
+            <a:endParaRPr lang="en-US" dirty="0"/>
           </a:p>
         </p:txBody>
       </p:sp>
     </p:spTree>
     <p:extLst>
       <p:ext uri="{BB962C8B-B14F-4D97-AF65-F5344CB8AC3E}">
-        <p14:creationId xmlns:p14="http://schemas.microsoft.com/office/powerpoint/2010/main" val="1150484597"/>
+        <p14:creationId xmlns:p14="http://schemas.microsoft.com/office/powerpoint/2010/main" val="118135021"/>
       </p:ext>
     </p:extLst>
   </p:cSld>
@@ -5333,80 +5881,37 @@
           <a:p>
             <a:r>
               <a:rPr lang="en-US" dirty="0"/>
-              <a:t>Installation</a:t>
-            </a:r>
-          </a:p>
-        </p:txBody>
-      </p:sp>
-      <p:sp>
-        <p:nvSpPr>
-          <p:cNvPr id="3" name="Content Placeholder 2"/>
-          <p:cNvSpPr>
-            <a:spLocks noGrp="1"/>
-          </p:cNvSpPr>
-          <p:nvPr>
-            <p:ph idx="1"/>
-          </p:nvPr>
-        </p:nvSpPr>
-        <p:spPr/>
-        <p:txBody>
-          <a:bodyPr/>
-          <a:lstStyle/>
-          <a:p>
-            <a:r>
-              <a:rPr lang="en-US" sz="2400" dirty="0"/>
-              <a:t>Don’t do on production!</a:t>
-            </a:r>
-          </a:p>
-          <a:p>
-            <a:endParaRPr lang="en-US" sz="2200" dirty="0"/>
-          </a:p>
-          <a:p>
-            <a:r>
-              <a:rPr lang="en-US" sz="2400" dirty="0"/>
-              <a:t>Two scripts</a:t>
-            </a:r>
-          </a:p>
-          <a:p>
-            <a:pPr lvl="1"/>
-            <a:r>
-              <a:rPr lang="en-US" sz="2000" dirty="0" err="1"/>
-              <a:t>SetClrEnabled.sql</a:t>
-            </a:r>
-            <a:r>
-              <a:rPr lang="en-US" sz="2000" dirty="0"/>
-              <a:t> – Enables CLR, sort of a “configure” script</a:t>
-            </a:r>
-          </a:p>
-          <a:p>
-            <a:pPr lvl="1"/>
-            <a:r>
-              <a:rPr lang="en-US" sz="2000" dirty="0" err="1"/>
-              <a:t>tSQLt.class.sql</a:t>
-            </a:r>
-            <a:r>
-              <a:rPr lang="en-US" sz="2000" dirty="0"/>
-              <a:t> – The actual </a:t>
-            </a:r>
-            <a:r>
-              <a:rPr lang="en-US" sz="2000" dirty="0" err="1"/>
-              <a:t>tSQLt</a:t>
-            </a:r>
-            <a:r>
-              <a:rPr lang="en-US" sz="2000" dirty="0"/>
-              <a:t> goodness</a:t>
-            </a:r>
-          </a:p>
-          <a:p>
-            <a:pPr lvl="1"/>
-            <a:endParaRPr lang="en-US" sz="2000" dirty="0"/>
+              <a:t>Examples</a:t>
+            </a:r>
+          </a:p>
+        </p:txBody>
+      </p:sp>
+      <p:sp>
+        <p:nvSpPr>
+          <p:cNvPr id="3" name="Text Placeholder 2"/>
+          <p:cNvSpPr>
+            <a:spLocks noGrp="1"/>
+          </p:cNvSpPr>
+          <p:nvPr>
+            <p:ph type="body" idx="1"/>
+          </p:nvPr>
+        </p:nvSpPr>
+        <p:spPr/>
+        <p:txBody>
+          <a:bodyPr/>
+          <a:lstStyle/>
+          <a:p>
+            <a:r>
+              <a:rPr lang="en-US" dirty="0"/>
+              <a:t>Note: Some examples use AdventureWorks2014</a:t>
+            </a:r>
           </a:p>
         </p:txBody>
       </p:sp>
     </p:spTree>
     <p:extLst>
       <p:ext uri="{BB962C8B-B14F-4D97-AF65-F5344CB8AC3E}">
-        <p14:creationId xmlns:p14="http://schemas.microsoft.com/office/powerpoint/2010/main" val="4223941015"/>
+        <p14:creationId xmlns:p14="http://schemas.microsoft.com/office/powerpoint/2010/main" val="1150484597"/>
       </p:ext>
     </p:extLst>
   </p:cSld>
@@ -5450,7 +5955,7 @@
           <a:p>
             <a:r>
               <a:rPr lang="en-US" dirty="0"/>
-              <a:t>Test classes</a:t>
+              <a:t>Installation</a:t>
             </a:r>
           </a:p>
         </p:txBody>
@@ -5471,86 +5976,59 @@
           <a:lstStyle/>
           <a:p>
             <a:r>
-              <a:rPr lang="en-US" dirty="0"/>
-              <a:t>Procedure: </a:t>
+              <a:rPr lang="en-US" sz="2400" dirty="0"/>
+              <a:t>Don’t do on production!</a:t>
+            </a:r>
+          </a:p>
+          <a:p>
+            <a:endParaRPr lang="en-US" sz="2200" dirty="0"/>
+          </a:p>
+          <a:p>
+            <a:r>
+              <a:rPr lang="en-US" sz="2400" dirty="0"/>
+              <a:t>Two scripts</a:t>
             </a:r>
           </a:p>
           <a:p>
             <a:pPr lvl="1"/>
             <a:r>
-              <a:rPr lang="en-US" dirty="0"/>
-              <a:t>Create via </a:t>
-            </a:r>
-            <a:r>
-              <a:rPr lang="en-US" dirty="0" err="1"/>
-              <a:t>tSQLt.NewTestClass</a:t>
-            </a:r>
-            <a:r>
-              <a:rPr lang="en-US" dirty="0"/>
-              <a:t> ‘</a:t>
-            </a:r>
-            <a:r>
-              <a:rPr lang="en-US" dirty="0" err="1"/>
-              <a:t>testClassName</a:t>
-            </a:r>
-            <a:r>
-              <a:rPr lang="en-US" dirty="0"/>
-              <a:t>’</a:t>
+              <a:rPr lang="en-US" sz="2000" dirty="0" err="1"/>
+              <a:t>SetClrEnabled.sql</a:t>
+            </a:r>
+            <a:r>
+              <a:rPr lang="en-US" sz="2000" dirty="0"/>
+              <a:t> – Enables CLR, sort of a “configure” script</a:t>
             </a:r>
           </a:p>
           <a:p>
             <a:pPr lvl="1"/>
             <a:r>
-              <a:rPr lang="en-US" dirty="0"/>
-              <a:t>Drop with </a:t>
-            </a:r>
-            <a:r>
-              <a:rPr lang="en-US" dirty="0" err="1"/>
-              <a:t>tSQLt.DropClass</a:t>
-            </a:r>
-            <a:r>
-              <a:rPr lang="en-US" dirty="0"/>
-              <a:t> ‘</a:t>
-            </a:r>
-            <a:r>
-              <a:rPr lang="en-US" dirty="0" err="1"/>
-              <a:t>testClassName</a:t>
-            </a:r>
-            <a:r>
-              <a:rPr lang="en-US" dirty="0"/>
-              <a:t>’</a:t>
-            </a:r>
-          </a:p>
-          <a:p>
-            <a:endParaRPr lang="en-US" dirty="0"/>
-          </a:p>
-          <a:p>
-            <a:r>
-              <a:rPr lang="en-US" dirty="0"/>
-              <a:t>Wait – classes?</a:t>
+              <a:rPr lang="en-US" sz="2000" dirty="0" err="1"/>
+              <a:t>tSQLt.class.sql</a:t>
+            </a:r>
+            <a:r>
+              <a:rPr lang="en-US" sz="2000" dirty="0"/>
+              <a:t> – The actual </a:t>
+            </a:r>
+            <a:r>
+              <a:rPr lang="en-US" sz="2000" dirty="0" err="1"/>
+              <a:t>tSQLt</a:t>
+            </a:r>
+            <a:r>
+              <a:rPr lang="en-US" sz="2000" dirty="0"/>
+              <a:t> goodness</a:t>
             </a:r>
           </a:p>
           <a:p>
             <a:pPr lvl="1"/>
-            <a:r>
-              <a:rPr lang="en-US" dirty="0"/>
-              <a:t>They are schemas, with some extra information so that </a:t>
-            </a:r>
-            <a:r>
-              <a:rPr lang="en-US" dirty="0" err="1"/>
-              <a:t>tSQLt</a:t>
-            </a:r>
-            <a:r>
-              <a:rPr lang="en-US" dirty="0"/>
-              <a:t> knows they are test classes</a:t>
-            </a:r>
+            <a:endParaRPr lang="en-US" sz="2000" dirty="0"/>
           </a:p>
         </p:txBody>
       </p:sp>
     </p:spTree>
     <p:extLst>
       <p:ext uri="{BB962C8B-B14F-4D97-AF65-F5344CB8AC3E}">
-        <p14:creationId xmlns:p14="http://schemas.microsoft.com/office/powerpoint/2010/main" val="4044539205"/>
+        <p14:creationId xmlns:p14="http://schemas.microsoft.com/office/powerpoint/2010/main" val="4223941015"/>
       </p:ext>
     </p:extLst>
   </p:cSld>
@@ -5594,7 +6072,7 @@
           <a:p>
             <a:r>
               <a:rPr lang="en-US" dirty="0"/>
-              <a:t>Creating Tests</a:t>
+              <a:t>Test classes</a:t>
             </a:r>
           </a:p>
         </p:txBody>
@@ -5611,14 +6089,74 @@
         </p:nvSpPr>
         <p:spPr/>
         <p:txBody>
-          <a:bodyPr>
-            <a:normAutofit/>
-          </a:bodyPr>
-          <a:lstStyle/>
-          <a:p>
-            <a:r>
-              <a:rPr lang="en-US" dirty="0"/>
-              <a:t>Like </a:t>
+          <a:bodyPr/>
+          <a:lstStyle/>
+          <a:p>
+            <a:r>
+              <a:rPr lang="en-US" dirty="0"/>
+              <a:t>Procedure: </a:t>
+            </a:r>
+          </a:p>
+          <a:p>
+            <a:pPr lvl="1"/>
+            <a:r>
+              <a:rPr lang="en-US" dirty="0"/>
+              <a:t>Create via </a:t>
+            </a:r>
+            <a:r>
+              <a:rPr lang="en-US" dirty="0" err="1"/>
+              <a:t>tSQLt.NewTestClass</a:t>
+            </a:r>
+            <a:r>
+              <a:rPr lang="en-US" dirty="0"/>
+              <a:t> ‘</a:t>
+            </a:r>
+            <a:r>
+              <a:rPr lang="en-US" dirty="0" err="1"/>
+              <a:t>testClassName</a:t>
+            </a:r>
+            <a:r>
+              <a:rPr lang="en-US" dirty="0"/>
+              <a:t>’</a:t>
+            </a:r>
+          </a:p>
+          <a:p>
+            <a:pPr lvl="1"/>
+            <a:r>
+              <a:rPr lang="en-US" dirty="0"/>
+              <a:t>Drop with </a:t>
+            </a:r>
+            <a:r>
+              <a:rPr lang="en-US" dirty="0" err="1"/>
+              <a:t>tSQLt.DropClass</a:t>
+            </a:r>
+            <a:r>
+              <a:rPr lang="en-US" dirty="0"/>
+              <a:t> ‘</a:t>
+            </a:r>
+            <a:r>
+              <a:rPr lang="en-US" dirty="0" err="1"/>
+              <a:t>testClassName</a:t>
+            </a:r>
+            <a:r>
+              <a:rPr lang="en-US" dirty="0"/>
+              <a:t>’</a:t>
+            </a:r>
+          </a:p>
+          <a:p>
+            <a:endParaRPr lang="en-US" dirty="0"/>
+          </a:p>
+          <a:p>
+            <a:r>
+              <a:rPr lang="en-US" dirty="0"/>
+              <a:t>Wait – classes?</a:t>
+            </a:r>
+          </a:p>
+          <a:p>
+            <a:pPr lvl="1"/>
+            <a:r>
+              <a:rPr lang="en-US" dirty="0"/>
+              <a:t>They are schemas, with some extra information so that </a:t>
             </a:r>
             <a:r>
               <a:rPr lang="en-US" dirty="0" err="1"/>
@@ -5626,66 +6164,15 @@
             </a:r>
             <a:r>
               <a:rPr lang="en-US" dirty="0"/>
-              <a:t> ‘functions’ we are writing stored procedures</a:t>
-            </a:r>
-          </a:p>
-          <a:p>
-            <a:pPr lvl="1"/>
-            <a:r>
-              <a:rPr lang="en-US" dirty="0"/>
-              <a:t>Framework automatically runs these within transactions, and rolls them back afterwards</a:t>
-            </a:r>
-          </a:p>
-          <a:p>
-            <a:pPr lvl="1"/>
-            <a:r>
-              <a:rPr lang="en-US" dirty="0"/>
-              <a:t>Key for preserving items we mock, not deleting actual data, and not keeping test data</a:t>
-            </a:r>
-          </a:p>
-          <a:p>
-            <a:pPr lvl="1"/>
-            <a:endParaRPr lang="en-US" dirty="0"/>
-          </a:p>
-          <a:p>
-            <a:r>
-              <a:rPr lang="en-US" dirty="0"/>
-              <a:t>Convention:  </a:t>
-            </a:r>
-            <a:r>
-              <a:rPr lang="en-US" dirty="0" err="1"/>
-              <a:t>testClassName</a:t>
-            </a:r>
-            <a:r>
-              <a:rPr lang="en-US" dirty="0"/>
-              <a:t>.[Test brief description]</a:t>
-            </a:r>
-          </a:p>
-          <a:p>
-            <a:pPr lvl="1"/>
-            <a:endParaRPr lang="en-US" b="1" dirty="0"/>
-          </a:p>
-          <a:p>
-            <a:r>
-              <a:rPr lang="en-US" b="1" dirty="0"/>
-              <a:t>Important that test name/description start with “test”!</a:t>
-            </a:r>
-            <a:endParaRPr lang="en-US" dirty="0"/>
-          </a:p>
-          <a:p>
-            <a:pPr lvl="1"/>
-            <a:endParaRPr lang="en-US" b="1" dirty="0"/>
-          </a:p>
-          <a:p>
-            <a:pPr lvl="1"/>
-            <a:endParaRPr lang="en-US" dirty="0"/>
+              <a:t> knows they are test classes</a:t>
+            </a:r>
           </a:p>
         </p:txBody>
       </p:sp>
     </p:spTree>
     <p:extLst>
       <p:ext uri="{BB962C8B-B14F-4D97-AF65-F5344CB8AC3E}">
-        <p14:creationId xmlns:p14="http://schemas.microsoft.com/office/powerpoint/2010/main" val="3428107290"/>
+        <p14:creationId xmlns:p14="http://schemas.microsoft.com/office/powerpoint/2010/main" val="4044539205"/>
       </p:ext>
     </p:extLst>
   </p:cSld>
@@ -5729,7 +6216,7 @@
           <a:p>
             <a:r>
               <a:rPr lang="en-US" dirty="0"/>
-              <a:t>Running Tests</a:t>
+              <a:t>Creating Tests</a:t>
             </a:r>
           </a:p>
         </p:txBody>
@@ -5746,53 +6233,46 @@
         </p:nvSpPr>
         <p:spPr/>
         <p:txBody>
-          <a:bodyPr/>
-          <a:lstStyle/>
-          <a:p>
-            <a:r>
-              <a:rPr lang="en-US" dirty="0"/>
-              <a:t>Several options</a:t>
+          <a:bodyPr>
+            <a:normAutofit/>
+          </a:bodyPr>
+          <a:lstStyle/>
+          <a:p>
+            <a:r>
+              <a:rPr lang="en-US" dirty="0"/>
+              <a:t>Like </a:t>
+            </a:r>
+            <a:r>
+              <a:rPr lang="en-US" dirty="0" err="1"/>
+              <a:t>tSQLt</a:t>
+            </a:r>
+            <a:r>
+              <a:rPr lang="en-US" dirty="0"/>
+              <a:t> ‘functions’ we are writing stored procedures</a:t>
             </a:r>
           </a:p>
           <a:p>
             <a:pPr lvl="1"/>
             <a:r>
               <a:rPr lang="en-US" dirty="0"/>
-              <a:t>Run them all</a:t>
-            </a:r>
-          </a:p>
-          <a:p>
-            <a:pPr lvl="2"/>
-            <a:r>
-              <a:rPr lang="en-US" dirty="0"/>
-              <a:t>EXEC </a:t>
-            </a:r>
-            <a:r>
-              <a:rPr lang="en-US" dirty="0" err="1"/>
-              <a:t>tSQLt.RunAll</a:t>
-            </a:r>
-            <a:endParaRPr lang="en-US" dirty="0"/>
+              <a:t>Framework automatically runs these within transactions, and rolls them back afterwards</a:t>
+            </a:r>
           </a:p>
           <a:p>
             <a:pPr lvl="1"/>
             <a:r>
               <a:rPr lang="en-US" dirty="0"/>
-              <a:t>Run one class</a:t>
-            </a:r>
-          </a:p>
-          <a:p>
-            <a:pPr lvl="2"/>
-            <a:r>
-              <a:rPr lang="en-US" dirty="0"/>
-              <a:t>EXEC </a:t>
-            </a:r>
-            <a:r>
-              <a:rPr lang="en-US" dirty="0" err="1"/>
-              <a:t>tSQLt.Run</a:t>
-            </a:r>
-            <a:r>
-              <a:rPr lang="en-US" dirty="0"/>
-              <a:t> ‘</a:t>
+              <a:t>Key for preserving items we mock, not deleting actual data, and not keeping test data</a:t>
+            </a:r>
+          </a:p>
+          <a:p>
+            <a:pPr lvl="1"/>
+            <a:endParaRPr lang="en-US" dirty="0"/>
+          </a:p>
+          <a:p>
+            <a:r>
+              <a:rPr lang="en-US" dirty="0"/>
+              <a:t>Convention:  </a:t>
             </a:r>
             <a:r>
               <a:rPr lang="en-US" dirty="0" err="1"/>
@@ -5800,52 +6280,34 @@
             </a:r>
             <a:r>
               <a:rPr lang="en-US" dirty="0"/>
-              <a:t>’</a:t>
+              <a:t>.[Test brief description]</a:t>
             </a:r>
           </a:p>
           <a:p>
             <a:pPr lvl="1"/>
-            <a:r>
-              <a:rPr lang="en-US" dirty="0"/>
-              <a:t>Run one test</a:t>
-            </a:r>
-          </a:p>
-          <a:p>
-            <a:pPr lvl="2"/>
-            <a:r>
-              <a:rPr lang="en-US" dirty="0"/>
-              <a:t>EXEC </a:t>
-            </a:r>
-            <a:r>
-              <a:rPr lang="en-US" dirty="0" err="1"/>
-              <a:t>tSQLt.Run</a:t>
-            </a:r>
-            <a:r>
-              <a:rPr lang="en-US" dirty="0"/>
-              <a:t> ‘</a:t>
-            </a:r>
-            <a:r>
-              <a:rPr lang="en-US" dirty="0" err="1"/>
-              <a:t>testClassName</a:t>
-            </a:r>
-            <a:r>
-              <a:rPr lang="en-US" dirty="0"/>
-              <a:t>.[Test full name]’</a:t>
-            </a:r>
-          </a:p>
-          <a:p>
-            <a:pPr lvl="2"/>
-            <a:r>
-              <a:rPr lang="en-US" dirty="0"/>
-              <a:t>Repeated calls without arguments will run previous test</a:t>
-            </a:r>
+            <a:endParaRPr lang="en-US" b="1" dirty="0"/>
+          </a:p>
+          <a:p>
+            <a:r>
+              <a:rPr lang="en-US" b="1" dirty="0"/>
+              <a:t>Important that test name/description start with “test”!</a:t>
+            </a:r>
+            <a:endParaRPr lang="en-US" dirty="0"/>
+          </a:p>
+          <a:p>
+            <a:pPr lvl="1"/>
+            <a:endParaRPr lang="en-US" b="1" dirty="0"/>
+          </a:p>
+          <a:p>
+            <a:pPr lvl="1"/>
+            <a:endParaRPr lang="en-US" dirty="0"/>
           </a:p>
         </p:txBody>
       </p:sp>
     </p:spTree>
     <p:extLst>
       <p:ext uri="{BB962C8B-B14F-4D97-AF65-F5344CB8AC3E}">
-        <p14:creationId xmlns:p14="http://schemas.microsoft.com/office/powerpoint/2010/main" val="1870860601"/>
+        <p14:creationId xmlns:p14="http://schemas.microsoft.com/office/powerpoint/2010/main" val="3428107290"/>
       </p:ext>
     </p:extLst>
   </p:cSld>

</xml_diff>